<commit_message>
correct scgan-3d's discriminator structure
</commit_message>
<xml_diff>
--- a/SCGAN-3D/images/绘图/scgan.discriminator&generator.pptx
+++ b/SCGAN-3D/images/绘图/scgan.discriminator&generator.pptx
@@ -1377,7 +1377,7 @@
           <a:p>
             <a:fld id="{6D50ECB8-EDEB-4463-943A-7364A57231A5}" type="datetimeFigureOut">
               <a:rPr lang="zh-CN" altLang="en-US" smtClean="0"/>
-              <a:t>2020/4/26</a:t>
+              <a:t>2020/5/25</a:t>
             </a:fld>
             <a:endParaRPr lang="zh-CN" altLang="en-US"/>
           </a:p>
@@ -1575,7 +1575,7 @@
           <a:p>
             <a:fld id="{6D50ECB8-EDEB-4463-943A-7364A57231A5}" type="datetimeFigureOut">
               <a:rPr lang="zh-CN" altLang="en-US" smtClean="0"/>
-              <a:t>2020/4/26</a:t>
+              <a:t>2020/5/25</a:t>
             </a:fld>
             <a:endParaRPr lang="zh-CN" altLang="en-US"/>
           </a:p>
@@ -1783,7 +1783,7 @@
           <a:p>
             <a:fld id="{6D50ECB8-EDEB-4463-943A-7364A57231A5}" type="datetimeFigureOut">
               <a:rPr lang="zh-CN" altLang="en-US" smtClean="0"/>
-              <a:t>2020/4/26</a:t>
+              <a:t>2020/5/25</a:t>
             </a:fld>
             <a:endParaRPr lang="zh-CN" altLang="en-US"/>
           </a:p>
@@ -1981,7 +1981,7 @@
           <a:p>
             <a:fld id="{6D50ECB8-EDEB-4463-943A-7364A57231A5}" type="datetimeFigureOut">
               <a:rPr lang="zh-CN" altLang="en-US" smtClean="0"/>
-              <a:t>2020/4/26</a:t>
+              <a:t>2020/5/25</a:t>
             </a:fld>
             <a:endParaRPr lang="zh-CN" altLang="en-US"/>
           </a:p>
@@ -2256,7 +2256,7 @@
           <a:p>
             <a:fld id="{6D50ECB8-EDEB-4463-943A-7364A57231A5}" type="datetimeFigureOut">
               <a:rPr lang="zh-CN" altLang="en-US" smtClean="0"/>
-              <a:t>2020/4/26</a:t>
+              <a:t>2020/5/25</a:t>
             </a:fld>
             <a:endParaRPr lang="zh-CN" altLang="en-US"/>
           </a:p>
@@ -2521,7 +2521,7 @@
           <a:p>
             <a:fld id="{6D50ECB8-EDEB-4463-943A-7364A57231A5}" type="datetimeFigureOut">
               <a:rPr lang="zh-CN" altLang="en-US" smtClean="0"/>
-              <a:t>2020/4/26</a:t>
+              <a:t>2020/5/25</a:t>
             </a:fld>
             <a:endParaRPr lang="zh-CN" altLang="en-US"/>
           </a:p>
@@ -2933,7 +2933,7 @@
           <a:p>
             <a:fld id="{6D50ECB8-EDEB-4463-943A-7364A57231A5}" type="datetimeFigureOut">
               <a:rPr lang="zh-CN" altLang="en-US" smtClean="0"/>
-              <a:t>2020/4/26</a:t>
+              <a:t>2020/5/25</a:t>
             </a:fld>
             <a:endParaRPr lang="zh-CN" altLang="en-US"/>
           </a:p>
@@ -3074,7 +3074,7 @@
           <a:p>
             <a:fld id="{6D50ECB8-EDEB-4463-943A-7364A57231A5}" type="datetimeFigureOut">
               <a:rPr lang="zh-CN" altLang="en-US" smtClean="0"/>
-              <a:t>2020/4/26</a:t>
+              <a:t>2020/5/25</a:t>
             </a:fld>
             <a:endParaRPr lang="zh-CN" altLang="en-US"/>
           </a:p>
@@ -3187,7 +3187,7 @@
           <a:p>
             <a:fld id="{6D50ECB8-EDEB-4463-943A-7364A57231A5}" type="datetimeFigureOut">
               <a:rPr lang="zh-CN" altLang="en-US" smtClean="0"/>
-              <a:t>2020/4/26</a:t>
+              <a:t>2020/5/25</a:t>
             </a:fld>
             <a:endParaRPr lang="zh-CN" altLang="en-US"/>
           </a:p>
@@ -3498,7 +3498,7 @@
           <a:p>
             <a:fld id="{6D50ECB8-EDEB-4463-943A-7364A57231A5}" type="datetimeFigureOut">
               <a:rPr lang="zh-CN" altLang="en-US" smtClean="0"/>
-              <a:t>2020/4/26</a:t>
+              <a:t>2020/5/25</a:t>
             </a:fld>
             <a:endParaRPr lang="zh-CN" altLang="en-US"/>
           </a:p>
@@ -3786,7 +3786,7 @@
           <a:p>
             <a:fld id="{6D50ECB8-EDEB-4463-943A-7364A57231A5}" type="datetimeFigureOut">
               <a:rPr lang="zh-CN" altLang="en-US" smtClean="0"/>
-              <a:t>2020/4/26</a:t>
+              <a:t>2020/5/25</a:t>
             </a:fld>
             <a:endParaRPr lang="zh-CN" altLang="en-US"/>
           </a:p>
@@ -4027,7 +4027,7 @@
           <a:p>
             <a:fld id="{6D50ECB8-EDEB-4463-943A-7364A57231A5}" type="datetimeFigureOut">
               <a:rPr lang="zh-CN" altLang="en-US" smtClean="0"/>
-              <a:t>2020/4/26</a:t>
+              <a:t>2020/5/25</a:t>
             </a:fld>
             <a:endParaRPr lang="zh-CN" altLang="en-US"/>
           </a:p>
@@ -5215,10 +5215,10 @@
       </p:grpSpPr>
       <p:grpSp>
         <p:nvGrpSpPr>
-          <p:cNvPr id="20" name="组合 19">
-            <a:extLst>
-              <a:ext uri="{FF2B5EF4-FFF2-40B4-BE49-F238E27FC236}">
-                <a16:creationId xmlns:a16="http://schemas.microsoft.com/office/drawing/2014/main" id="{F75E9F00-4F3B-45C5-8028-D4703CFAAA67}"/>
+          <p:cNvPr id="6" name="组合 5">
+            <a:extLst>
+              <a:ext uri="{FF2B5EF4-FFF2-40B4-BE49-F238E27FC236}">
+                <a16:creationId xmlns:a16="http://schemas.microsoft.com/office/drawing/2014/main" id="{88A8F55D-FC1A-4CE4-BC03-02E92CC5AC3D}"/>
               </a:ext>
             </a:extLst>
           </p:cNvPr>
@@ -5235,10 +5235,10 @@
         </p:grpSpPr>
         <p:grpSp>
           <p:nvGrpSpPr>
-            <p:cNvPr id="5" name="组合 4">
+            <p:cNvPr id="20" name="组合 19">
               <a:extLst>
                 <a:ext uri="{FF2B5EF4-FFF2-40B4-BE49-F238E27FC236}">
-                  <a16:creationId xmlns:a16="http://schemas.microsoft.com/office/drawing/2014/main" id="{E065C352-29F5-4D97-97D3-854689A9CFBA}"/>
+                  <a16:creationId xmlns:a16="http://schemas.microsoft.com/office/drawing/2014/main" id="{F75E9F00-4F3B-45C5-8028-D4703CFAAA67}"/>
                 </a:ext>
               </a:extLst>
             </p:cNvPr>
@@ -5253,12 +5253,138 @@
               <a:chExt cx="6907696" cy="1987826"/>
             </a:xfrm>
           </p:grpSpPr>
+          <p:grpSp>
+            <p:nvGrpSpPr>
+              <p:cNvPr id="5" name="组合 4">
+                <a:extLst>
+                  <a:ext uri="{FF2B5EF4-FFF2-40B4-BE49-F238E27FC236}">
+                    <a16:creationId xmlns:a16="http://schemas.microsoft.com/office/drawing/2014/main" id="{E065C352-29F5-4D97-97D3-854689A9CFBA}"/>
+                  </a:ext>
+                </a:extLst>
+              </p:cNvPr>
+              <p:cNvGrpSpPr/>
+              <p:nvPr/>
+            </p:nvGrpSpPr>
+            <p:grpSpPr>
+              <a:xfrm>
+                <a:off x="2246244" y="2435087"/>
+                <a:ext cx="6907696" cy="1987826"/>
+                <a:chOff x="2246244" y="2435087"/>
+                <a:chExt cx="6907696" cy="1987826"/>
+              </a:xfrm>
+            </p:grpSpPr>
+            <p:pic>
+              <p:nvPicPr>
+                <p:cNvPr id="2" name="图片 1">
+                  <a:extLst>
+                    <a:ext uri="{FF2B5EF4-FFF2-40B4-BE49-F238E27FC236}">
+                      <a16:creationId xmlns:a16="http://schemas.microsoft.com/office/drawing/2014/main" id="{39DC24F3-D1CB-47C0-B243-C935E4A3093E}"/>
+                    </a:ext>
+                  </a:extLst>
+                </p:cNvPr>
+                <p:cNvPicPr>
+                  <a:picLocks noChangeAspect="1"/>
+                </p:cNvPicPr>
+                <p:nvPr/>
+              </p:nvPicPr>
+              <p:blipFill rotWithShape="1">
+                <a:blip r:embed="rId2">
+                  <a:extLst>
+                    <a:ext uri="{28A0092B-C50C-407E-A947-70E740481C1C}">
+                      <a14:useLocalDpi xmlns:a14="http://schemas.microsoft.com/office/drawing/2010/main" val="0"/>
+                    </a:ext>
+                  </a:extLst>
+                </a:blip>
+                <a:srcRect l="12811" t="34054" r="20734" b="33403"/>
+                <a:stretch/>
+              </p:blipFill>
+              <p:spPr>
+                <a:xfrm>
+                  <a:off x="2246244" y="2435087"/>
+                  <a:ext cx="5973417" cy="1987826"/>
+                </a:xfrm>
+                <a:prstGeom prst="rect">
+                  <a:avLst/>
+                </a:prstGeom>
+              </p:spPr>
+            </p:pic>
+            <p:pic>
+              <p:nvPicPr>
+                <p:cNvPr id="3" name="图片 2">
+                  <a:extLst>
+                    <a:ext uri="{FF2B5EF4-FFF2-40B4-BE49-F238E27FC236}">
+                      <a16:creationId xmlns:a16="http://schemas.microsoft.com/office/drawing/2014/main" id="{8CFD63DD-E8D7-425B-B55C-870BA2CD8557}"/>
+                    </a:ext>
+                  </a:extLst>
+                </p:cNvPr>
+                <p:cNvPicPr>
+                  <a:picLocks noChangeAspect="1"/>
+                </p:cNvPicPr>
+                <p:nvPr/>
+              </p:nvPicPr>
+              <p:blipFill rotWithShape="1">
+                <a:blip r:embed="rId2">
+                  <a:extLst>
+                    <a:ext uri="{28A0092B-C50C-407E-A947-70E740481C1C}">
+                      <a14:useLocalDpi xmlns:a14="http://schemas.microsoft.com/office/drawing/2010/main" val="0"/>
+                    </a:ext>
+                  </a:extLst>
+                </a:blip>
+                <a:srcRect l="82767" t="36929" r="10045" b="48427"/>
+                <a:stretch/>
+              </p:blipFill>
+              <p:spPr>
+                <a:xfrm>
+                  <a:off x="8507897" y="3150704"/>
+                  <a:ext cx="646043" cy="894522"/>
+                </a:xfrm>
+                <a:prstGeom prst="rect">
+                  <a:avLst/>
+                </a:prstGeom>
+              </p:spPr>
+            </p:pic>
+            <p:pic>
+              <p:nvPicPr>
+                <p:cNvPr id="4" name="图片 3">
+                  <a:extLst>
+                    <a:ext uri="{FF2B5EF4-FFF2-40B4-BE49-F238E27FC236}">
+                      <a16:creationId xmlns:a16="http://schemas.microsoft.com/office/drawing/2014/main" id="{0F7794F9-266C-4686-836E-DCBE6EBE8295}"/>
+                    </a:ext>
+                  </a:extLst>
+                </p:cNvPr>
+                <p:cNvPicPr>
+                  <a:picLocks noChangeAspect="1"/>
+                </p:cNvPicPr>
+                <p:nvPr/>
+              </p:nvPicPr>
+              <p:blipFill rotWithShape="1">
+                <a:blip r:embed="rId3">
+                  <a:extLst>
+                    <a:ext uri="{28A0092B-C50C-407E-A947-70E740481C1C}">
+                      <a14:useLocalDpi xmlns:a14="http://schemas.microsoft.com/office/drawing/2010/main" val="0"/>
+                    </a:ext>
+                  </a:extLst>
+                </a:blip>
+                <a:srcRect l="84990" t="37031" r="7930" b="55959"/>
+                <a:stretch/>
+              </p:blipFill>
+              <p:spPr>
+                <a:xfrm>
+                  <a:off x="8497958" y="2454965"/>
+                  <a:ext cx="616226" cy="417444"/>
+                </a:xfrm>
+                <a:prstGeom prst="rect">
+                  <a:avLst/>
+                </a:prstGeom>
+              </p:spPr>
+            </p:pic>
+          </p:grpSp>
           <p:pic>
             <p:nvPicPr>
-              <p:cNvPr id="2" name="图片 1">
+              <p:cNvPr id="7" name="图片 6">
                 <a:extLst>
                   <a:ext uri="{FF2B5EF4-FFF2-40B4-BE49-F238E27FC236}">
-                    <a16:creationId xmlns:a16="http://schemas.microsoft.com/office/drawing/2014/main" id="{39DC24F3-D1CB-47C0-B243-C935E4A3093E}"/>
+                    <a16:creationId xmlns:a16="http://schemas.microsoft.com/office/drawing/2014/main" id="{CFD6E3CE-1BAE-4ABC-8235-AD23ABC4365E}"/>
                   </a:ext>
                 </a:extLst>
               </p:cNvPr>
@@ -5275,13 +5401,13 @@
                   </a:ext>
                 </a:extLst>
               </a:blip>
-              <a:srcRect l="12811" t="34054" r="20734" b="33403"/>
+              <a:srcRect l="16994" t="38876" r="80862" b="59253"/>
               <a:stretch/>
             </p:blipFill>
             <p:spPr>
               <a:xfrm>
-                <a:off x="2246244" y="2435087"/>
-                <a:ext cx="5973417" cy="1987826"/>
+                <a:off x="2813051" y="2731293"/>
+                <a:ext cx="192672" cy="114301"/>
               </a:xfrm>
               <a:prstGeom prst="rect">
                 <a:avLst/>
@@ -5290,10 +5416,10 @@
           </p:pic>
           <p:pic>
             <p:nvPicPr>
-              <p:cNvPr id="3" name="图片 2">
+              <p:cNvPr id="11" name="图片 10">
                 <a:extLst>
                   <a:ext uri="{FF2B5EF4-FFF2-40B4-BE49-F238E27FC236}">
-                    <a16:creationId xmlns:a16="http://schemas.microsoft.com/office/drawing/2014/main" id="{8CFD63DD-E8D7-425B-B55C-870BA2CD8557}"/>
+                    <a16:creationId xmlns:a16="http://schemas.microsoft.com/office/drawing/2014/main" id="{6AE2FACC-B705-4673-946E-EEA10A5F325C}"/>
                   </a:ext>
                 </a:extLst>
               </p:cNvPr>
@@ -5310,13 +5436,13 @@
                   </a:ext>
                 </a:extLst>
               </a:blip>
-              <a:srcRect l="82767" t="36929" r="10045" b="48427"/>
+              <a:srcRect l="26306" t="39075" r="72237" b="59444"/>
               <a:stretch/>
             </p:blipFill>
             <p:spPr>
               <a:xfrm>
-                <a:off x="8507897" y="3150704"/>
-                <a:ext cx="646043" cy="894522"/>
+                <a:off x="3579673" y="2743198"/>
+                <a:ext cx="130970" cy="90487"/>
               </a:xfrm>
               <a:prstGeom prst="rect">
                 <a:avLst/>
@@ -5325,10 +5451,10 @@
           </p:pic>
           <p:pic>
             <p:nvPicPr>
-              <p:cNvPr id="4" name="图片 3">
+              <p:cNvPr id="14" name="图片 13">
                 <a:extLst>
                   <a:ext uri="{FF2B5EF4-FFF2-40B4-BE49-F238E27FC236}">
-                    <a16:creationId xmlns:a16="http://schemas.microsoft.com/office/drawing/2014/main" id="{0F7794F9-266C-4686-836E-DCBE6EBE8295}"/>
+                    <a16:creationId xmlns:a16="http://schemas.microsoft.com/office/drawing/2014/main" id="{FC5DE7C4-DD95-44DE-966F-9C9E05796385}"/>
                   </a:ext>
                 </a:extLst>
               </p:cNvPr>
@@ -5338,20 +5464,90 @@
               <p:nvPr/>
             </p:nvPicPr>
             <p:blipFill rotWithShape="1">
-              <a:blip r:embed="rId3">
+              <a:blip r:embed="rId2">
                 <a:extLst>
                   <a:ext uri="{28A0092B-C50C-407E-A947-70E740481C1C}">
                     <a14:useLocalDpi xmlns:a14="http://schemas.microsoft.com/office/drawing/2010/main" val="0"/>
                   </a:ext>
                 </a:extLst>
               </a:blip>
-              <a:srcRect l="84990" t="37031" r="7930" b="55959"/>
+              <a:srcRect l="36804" t="38876" r="61654" b="59182"/>
               <a:stretch/>
             </p:blipFill>
             <p:spPr>
               <a:xfrm>
-                <a:off x="8497958" y="2454965"/>
-                <a:ext cx="616226" cy="417444"/>
+                <a:off x="4523792" y="2729137"/>
+                <a:ext cx="138589" cy="118607"/>
+              </a:xfrm>
+              <a:prstGeom prst="rect">
+                <a:avLst/>
+              </a:prstGeom>
+            </p:spPr>
+          </p:pic>
+          <p:pic>
+            <p:nvPicPr>
+              <p:cNvPr id="16" name="图片 15">
+                <a:extLst>
+                  <a:ext uri="{FF2B5EF4-FFF2-40B4-BE49-F238E27FC236}">
+                    <a16:creationId xmlns:a16="http://schemas.microsoft.com/office/drawing/2014/main" id="{46FB5F33-8F29-4F0D-9252-6D57A7868A9E}"/>
+                  </a:ext>
+                </a:extLst>
+              </p:cNvPr>
+              <p:cNvPicPr>
+                <a:picLocks noChangeAspect="1"/>
+              </p:cNvPicPr>
+              <p:nvPr/>
+            </p:nvPicPr>
+            <p:blipFill rotWithShape="1">
+              <a:blip r:embed="rId2">
+                <a:extLst>
+                  <a:ext uri="{28A0092B-C50C-407E-A947-70E740481C1C}">
+                    <a14:useLocalDpi xmlns:a14="http://schemas.microsoft.com/office/drawing/2010/main" val="0"/>
+                  </a:ext>
+                </a:extLst>
+              </a:blip>
+              <a:srcRect l="46740" t="38884" r="51734" b="58787"/>
+              <a:stretch/>
+            </p:blipFill>
+            <p:spPr>
+              <a:xfrm>
+                <a:off x="5420702" y="2729137"/>
+                <a:ext cx="137161" cy="142276"/>
+              </a:xfrm>
+              <a:prstGeom prst="rect">
+                <a:avLst/>
+              </a:prstGeom>
+            </p:spPr>
+          </p:pic>
+          <p:pic>
+            <p:nvPicPr>
+              <p:cNvPr id="19" name="图片 18">
+                <a:extLst>
+                  <a:ext uri="{FF2B5EF4-FFF2-40B4-BE49-F238E27FC236}">
+                    <a16:creationId xmlns:a16="http://schemas.microsoft.com/office/drawing/2014/main" id="{62FD132E-573A-4883-A73B-C311AAB76FB6}"/>
+                  </a:ext>
+                </a:extLst>
+              </p:cNvPr>
+              <p:cNvPicPr>
+                <a:picLocks noChangeAspect="1"/>
+              </p:cNvPicPr>
+              <p:nvPr/>
+            </p:nvPicPr>
+            <p:blipFill rotWithShape="1">
+              <a:blip r:embed="rId2">
+                <a:extLst>
+                  <a:ext uri="{28A0092B-C50C-407E-A947-70E740481C1C}">
+                    <a14:useLocalDpi xmlns:a14="http://schemas.microsoft.com/office/drawing/2010/main" val="0"/>
+                  </a:ext>
+                </a:extLst>
+              </a:blip>
+              <a:srcRect l="56693" t="38913" r="41612" b="59216"/>
+              <a:stretch/>
+            </p:blipFill>
+            <p:spPr>
+              <a:xfrm>
+                <a:off x="6313803" y="2731518"/>
+                <a:ext cx="152400" cy="114300"/>
               </a:xfrm>
               <a:prstGeom prst="rect">
                 <a:avLst/>
@@ -5361,10 +5557,10 @@
         </p:grpSp>
         <p:pic>
           <p:nvPicPr>
-            <p:cNvPr id="7" name="图片 6">
+            <p:cNvPr id="12" name="图片 11">
               <a:extLst>
                 <a:ext uri="{FF2B5EF4-FFF2-40B4-BE49-F238E27FC236}">
-                  <a16:creationId xmlns:a16="http://schemas.microsoft.com/office/drawing/2014/main" id="{CFD6E3CE-1BAE-4ABC-8235-AD23ABC4365E}"/>
+                  <a16:creationId xmlns:a16="http://schemas.microsoft.com/office/drawing/2014/main" id="{F6EB6502-42A6-4E3A-9621-0915E2E0CA88}"/>
                 </a:ext>
               </a:extLst>
             </p:cNvPr>
@@ -5374,20 +5570,20 @@
             <p:nvPr/>
           </p:nvPicPr>
           <p:blipFill rotWithShape="1">
-            <a:blip r:embed="rId2">
+            <a:blip r:embed="rId4">
               <a:extLst>
                 <a:ext uri="{28A0092B-C50C-407E-A947-70E740481C1C}">
                   <a14:useLocalDpi xmlns:a14="http://schemas.microsoft.com/office/drawing/2010/main" val="0"/>
                 </a:ext>
               </a:extLst>
             </a:blip>
-            <a:srcRect l="16994" t="38876" r="80862" b="59253"/>
+            <a:srcRect l="59753" t="63455" r="32281" b="34624"/>
             <a:stretch/>
           </p:blipFill>
           <p:spPr>
             <a:xfrm>
-              <a:off x="2813051" y="2731293"/>
-              <a:ext cx="192672" cy="114301"/>
+              <a:off x="2913405" y="4270208"/>
+              <a:ext cx="729915" cy="120817"/>
             </a:xfrm>
             <a:prstGeom prst="rect">
               <a:avLst/>
@@ -5396,10 +5592,10 @@
         </p:pic>
         <p:pic>
           <p:nvPicPr>
-            <p:cNvPr id="11" name="图片 10">
+            <p:cNvPr id="13" name="图片 12">
               <a:extLst>
                 <a:ext uri="{FF2B5EF4-FFF2-40B4-BE49-F238E27FC236}">
-                  <a16:creationId xmlns:a16="http://schemas.microsoft.com/office/drawing/2014/main" id="{6AE2FACC-B705-4673-946E-EEA10A5F325C}"/>
+                  <a16:creationId xmlns:a16="http://schemas.microsoft.com/office/drawing/2014/main" id="{09029290-1988-4CEF-8807-6BCEA940D88A}"/>
                 </a:ext>
               </a:extLst>
             </p:cNvPr>
@@ -5409,20 +5605,20 @@
             <p:nvPr/>
           </p:nvPicPr>
           <p:blipFill rotWithShape="1">
-            <a:blip r:embed="rId2">
+            <a:blip r:embed="rId4">
               <a:extLst>
                 <a:ext uri="{28A0092B-C50C-407E-A947-70E740481C1C}">
                   <a14:useLocalDpi xmlns:a14="http://schemas.microsoft.com/office/drawing/2010/main" val="0"/>
                 </a:ext>
               </a:extLst>
             </a:blip>
-            <a:srcRect l="26306" t="39075" r="72237" b="59444"/>
+            <a:srcRect l="59753" t="63455" r="32281" b="34624"/>
             <a:stretch/>
           </p:blipFill>
           <p:spPr>
             <a:xfrm>
-              <a:off x="3579673" y="2743198"/>
-              <a:ext cx="130970" cy="90487"/>
+              <a:off x="3810508" y="4270208"/>
+              <a:ext cx="729915" cy="120817"/>
             </a:xfrm>
             <a:prstGeom prst="rect">
               <a:avLst/>
@@ -5431,10 +5627,10 @@
         </p:pic>
         <p:pic>
           <p:nvPicPr>
-            <p:cNvPr id="14" name="图片 13">
+            <p:cNvPr id="15" name="图片 14">
               <a:extLst>
                 <a:ext uri="{FF2B5EF4-FFF2-40B4-BE49-F238E27FC236}">
-                  <a16:creationId xmlns:a16="http://schemas.microsoft.com/office/drawing/2014/main" id="{FC5DE7C4-DD95-44DE-966F-9C9E05796385}"/>
+                  <a16:creationId xmlns:a16="http://schemas.microsoft.com/office/drawing/2014/main" id="{82078C91-8CD2-4378-A467-A7AE0655EE65}"/>
                 </a:ext>
               </a:extLst>
             </p:cNvPr>
@@ -5444,20 +5640,20 @@
             <p:nvPr/>
           </p:nvPicPr>
           <p:blipFill rotWithShape="1">
-            <a:blip r:embed="rId2">
+            <a:blip r:embed="rId4">
               <a:extLst>
                 <a:ext uri="{28A0092B-C50C-407E-A947-70E740481C1C}">
                   <a14:useLocalDpi xmlns:a14="http://schemas.microsoft.com/office/drawing/2010/main" val="0"/>
                 </a:ext>
               </a:extLst>
             </a:blip>
-            <a:srcRect l="36804" t="38876" r="61654" b="59182"/>
+            <a:srcRect l="59753" t="63455" r="32281" b="34624"/>
             <a:stretch/>
           </p:blipFill>
           <p:spPr>
             <a:xfrm>
-              <a:off x="4523792" y="2729137"/>
-              <a:ext cx="138589" cy="118607"/>
+              <a:off x="4699590" y="4270208"/>
+              <a:ext cx="729915" cy="120817"/>
             </a:xfrm>
             <a:prstGeom prst="rect">
               <a:avLst/>
@@ -5466,10 +5662,10 @@
         </p:pic>
         <p:pic>
           <p:nvPicPr>
-            <p:cNvPr id="16" name="图片 15">
+            <p:cNvPr id="17" name="图片 16">
               <a:extLst>
                 <a:ext uri="{FF2B5EF4-FFF2-40B4-BE49-F238E27FC236}">
-                  <a16:creationId xmlns:a16="http://schemas.microsoft.com/office/drawing/2014/main" id="{46FB5F33-8F29-4F0D-9252-6D57A7868A9E}"/>
+                  <a16:creationId xmlns:a16="http://schemas.microsoft.com/office/drawing/2014/main" id="{C98C54AD-F2CF-4E6C-A9D8-965ED3A89913}"/>
                 </a:ext>
               </a:extLst>
             </p:cNvPr>
@@ -5479,55 +5675,20 @@
             <p:nvPr/>
           </p:nvPicPr>
           <p:blipFill rotWithShape="1">
-            <a:blip r:embed="rId2">
+            <a:blip r:embed="rId4">
               <a:extLst>
                 <a:ext uri="{28A0092B-C50C-407E-A947-70E740481C1C}">
                   <a14:useLocalDpi xmlns:a14="http://schemas.microsoft.com/office/drawing/2010/main" val="0"/>
                 </a:ext>
               </a:extLst>
             </a:blip>
-            <a:srcRect l="46740" t="38884" r="51734" b="58787"/>
+            <a:srcRect l="59753" t="63455" r="32281" b="34624"/>
             <a:stretch/>
           </p:blipFill>
           <p:spPr>
             <a:xfrm>
-              <a:off x="5420702" y="2729137"/>
-              <a:ext cx="137161" cy="142276"/>
-            </a:xfrm>
-            <a:prstGeom prst="rect">
-              <a:avLst/>
-            </a:prstGeom>
-          </p:spPr>
-        </p:pic>
-        <p:pic>
-          <p:nvPicPr>
-            <p:cNvPr id="19" name="图片 18">
-              <a:extLst>
-                <a:ext uri="{FF2B5EF4-FFF2-40B4-BE49-F238E27FC236}">
-                  <a16:creationId xmlns:a16="http://schemas.microsoft.com/office/drawing/2014/main" id="{62FD132E-573A-4883-A73B-C311AAB76FB6}"/>
-                </a:ext>
-              </a:extLst>
-            </p:cNvPr>
-            <p:cNvPicPr>
-              <a:picLocks noChangeAspect="1"/>
-            </p:cNvPicPr>
-            <p:nvPr/>
-          </p:nvPicPr>
-          <p:blipFill rotWithShape="1">
-            <a:blip r:embed="rId2">
-              <a:extLst>
-                <a:ext uri="{28A0092B-C50C-407E-A947-70E740481C1C}">
-                  <a14:useLocalDpi xmlns:a14="http://schemas.microsoft.com/office/drawing/2010/main" val="0"/>
-                </a:ext>
-              </a:extLst>
-            </a:blip>
-            <a:srcRect l="56693" t="38913" r="41612" b="59216"/>
-            <a:stretch/>
-          </p:blipFill>
-          <p:spPr>
-            <a:xfrm>
-              <a:off x="6313803" y="2731518"/>
-              <a:ext cx="152400" cy="114300"/>
+              <a:off x="5595022" y="4270208"/>
+              <a:ext cx="729915" cy="120817"/>
             </a:xfrm>
             <a:prstGeom prst="rect">
               <a:avLst/>
@@ -5653,216 +5814,377 @@
           <a:chExt cx="0" cy="0"/>
         </a:xfrm>
       </p:grpSpPr>
-      <p:pic>
-        <p:nvPicPr>
-          <p:cNvPr id="2" name="图片 1">
-            <a:extLst>
-              <a:ext uri="{FF2B5EF4-FFF2-40B4-BE49-F238E27FC236}">
-                <a16:creationId xmlns:a16="http://schemas.microsoft.com/office/drawing/2014/main" id="{39DC24F3-D1CB-47C0-B243-C935E4A3093E}"/>
-              </a:ext>
-            </a:extLst>
-          </p:cNvPr>
-          <p:cNvPicPr>
-            <a:picLocks noChangeAspect="1"/>
-          </p:cNvPicPr>
+      <p:grpSp>
+        <p:nvGrpSpPr>
+          <p:cNvPr id="12" name="组合 11">
+            <a:extLst>
+              <a:ext uri="{FF2B5EF4-FFF2-40B4-BE49-F238E27FC236}">
+                <a16:creationId xmlns:a16="http://schemas.microsoft.com/office/drawing/2014/main" id="{D39BD006-5B6B-49DB-849D-5541082B7821}"/>
+              </a:ext>
+            </a:extLst>
+          </p:cNvPr>
+          <p:cNvGrpSpPr/>
           <p:nvPr/>
-        </p:nvPicPr>
-        <p:blipFill rotWithShape="1">
-          <a:blip r:embed="rId2">
-            <a:extLst>
-              <a:ext uri="{28A0092B-C50C-407E-A947-70E740481C1C}">
-                <a14:useLocalDpi xmlns:a14="http://schemas.microsoft.com/office/drawing/2010/main" val="0"/>
-              </a:ext>
-            </a:extLst>
-          </a:blip>
-          <a:srcRect l="12811" t="34054" r="20734" b="33403"/>
-          <a:stretch/>
-        </p:blipFill>
-        <p:spPr>
+        </p:nvGrpSpPr>
+        <p:grpSpPr>
           <a:xfrm>
             <a:off x="2246244" y="2435087"/>
             <a:ext cx="5973417" cy="1987826"/>
+            <a:chOff x="2246244" y="2435087"/>
+            <a:chExt cx="5973417" cy="1987826"/>
           </a:xfrm>
-          <a:prstGeom prst="rect">
-            <a:avLst/>
-          </a:prstGeom>
-        </p:spPr>
-      </p:pic>
-      <p:pic>
-        <p:nvPicPr>
-          <p:cNvPr id="3" name="图片 2">
-            <a:extLst>
-              <a:ext uri="{FF2B5EF4-FFF2-40B4-BE49-F238E27FC236}">
-                <a16:creationId xmlns:a16="http://schemas.microsoft.com/office/drawing/2014/main" id="{905013FC-B637-4B06-A0C8-8C9073796AB3}"/>
-              </a:ext>
-            </a:extLst>
-          </p:cNvPr>
-          <p:cNvPicPr>
-            <a:picLocks noChangeAspect="1"/>
-          </p:cNvPicPr>
-          <p:nvPr/>
-        </p:nvPicPr>
-        <p:blipFill rotWithShape="1">
-          <a:blip r:embed="rId2">
-            <a:extLst>
-              <a:ext uri="{28A0092B-C50C-407E-A947-70E740481C1C}">
-                <a14:useLocalDpi xmlns:a14="http://schemas.microsoft.com/office/drawing/2010/main" val="0"/>
-              </a:ext>
-            </a:extLst>
-          </a:blip>
-          <a:srcRect l="16994" t="38876" r="80862" b="59253"/>
-          <a:stretch/>
-        </p:blipFill>
-        <p:spPr>
-          <a:xfrm>
-            <a:off x="2813051" y="2731293"/>
-            <a:ext cx="192672" cy="114301"/>
-          </a:xfrm>
-          <a:prstGeom prst="rect">
-            <a:avLst/>
-          </a:prstGeom>
-        </p:spPr>
-      </p:pic>
-      <p:pic>
-        <p:nvPicPr>
-          <p:cNvPr id="4" name="图片 3">
-            <a:extLst>
-              <a:ext uri="{FF2B5EF4-FFF2-40B4-BE49-F238E27FC236}">
-                <a16:creationId xmlns:a16="http://schemas.microsoft.com/office/drawing/2014/main" id="{EA2C0CF1-04AC-40D1-94E1-0F0A73E33865}"/>
-              </a:ext>
-            </a:extLst>
-          </p:cNvPr>
-          <p:cNvPicPr>
-            <a:picLocks noChangeAspect="1"/>
-          </p:cNvPicPr>
-          <p:nvPr/>
-        </p:nvPicPr>
-        <p:blipFill rotWithShape="1">
-          <a:blip r:embed="rId2">
-            <a:extLst>
-              <a:ext uri="{28A0092B-C50C-407E-A947-70E740481C1C}">
-                <a14:useLocalDpi xmlns:a14="http://schemas.microsoft.com/office/drawing/2010/main" val="0"/>
-              </a:ext>
-            </a:extLst>
-          </a:blip>
-          <a:srcRect l="26306" t="39075" r="72237" b="59444"/>
-          <a:stretch/>
-        </p:blipFill>
-        <p:spPr>
-          <a:xfrm>
-            <a:off x="3579673" y="2743198"/>
-            <a:ext cx="130970" cy="90487"/>
-          </a:xfrm>
-          <a:prstGeom prst="rect">
-            <a:avLst/>
-          </a:prstGeom>
-        </p:spPr>
-      </p:pic>
-      <p:pic>
-        <p:nvPicPr>
-          <p:cNvPr id="5" name="图片 4">
-            <a:extLst>
-              <a:ext uri="{FF2B5EF4-FFF2-40B4-BE49-F238E27FC236}">
-                <a16:creationId xmlns:a16="http://schemas.microsoft.com/office/drawing/2014/main" id="{65410BA3-C476-456A-93CB-D12F32F087FE}"/>
-              </a:ext>
-            </a:extLst>
-          </p:cNvPr>
-          <p:cNvPicPr>
-            <a:picLocks noChangeAspect="1"/>
-          </p:cNvPicPr>
-          <p:nvPr/>
-        </p:nvPicPr>
-        <p:blipFill rotWithShape="1">
-          <a:blip r:embed="rId2">
-            <a:extLst>
-              <a:ext uri="{28A0092B-C50C-407E-A947-70E740481C1C}">
-                <a14:useLocalDpi xmlns:a14="http://schemas.microsoft.com/office/drawing/2010/main" val="0"/>
-              </a:ext>
-            </a:extLst>
-          </a:blip>
-          <a:srcRect l="36804" t="38876" r="61654" b="59182"/>
-          <a:stretch/>
-        </p:blipFill>
-        <p:spPr>
-          <a:xfrm>
-            <a:off x="4523792" y="2729137"/>
-            <a:ext cx="138589" cy="118607"/>
-          </a:xfrm>
-          <a:prstGeom prst="rect">
-            <a:avLst/>
-          </a:prstGeom>
-        </p:spPr>
-      </p:pic>
-      <p:pic>
-        <p:nvPicPr>
-          <p:cNvPr id="6" name="图片 5">
-            <a:extLst>
-              <a:ext uri="{FF2B5EF4-FFF2-40B4-BE49-F238E27FC236}">
-                <a16:creationId xmlns:a16="http://schemas.microsoft.com/office/drawing/2014/main" id="{7CF457F5-9C02-4BB5-B1B1-F4012A3E4E8C}"/>
-              </a:ext>
-            </a:extLst>
-          </p:cNvPr>
-          <p:cNvPicPr>
-            <a:picLocks noChangeAspect="1"/>
-          </p:cNvPicPr>
-          <p:nvPr/>
-        </p:nvPicPr>
-        <p:blipFill rotWithShape="1">
-          <a:blip r:embed="rId2">
-            <a:extLst>
-              <a:ext uri="{28A0092B-C50C-407E-A947-70E740481C1C}">
-                <a14:useLocalDpi xmlns:a14="http://schemas.microsoft.com/office/drawing/2010/main" val="0"/>
-              </a:ext>
-            </a:extLst>
-          </a:blip>
-          <a:srcRect l="46740" t="38884" r="51734" b="58787"/>
-          <a:stretch/>
-        </p:blipFill>
-        <p:spPr>
-          <a:xfrm>
-            <a:off x="5420702" y="2729137"/>
-            <a:ext cx="137161" cy="142276"/>
-          </a:xfrm>
-          <a:prstGeom prst="rect">
-            <a:avLst/>
-          </a:prstGeom>
-        </p:spPr>
-      </p:pic>
-      <p:pic>
-        <p:nvPicPr>
-          <p:cNvPr id="7" name="图片 6">
-            <a:extLst>
-              <a:ext uri="{FF2B5EF4-FFF2-40B4-BE49-F238E27FC236}">
-                <a16:creationId xmlns:a16="http://schemas.microsoft.com/office/drawing/2014/main" id="{854E6A78-81F5-4242-B1CD-6CDD2A394B5B}"/>
-              </a:ext>
-            </a:extLst>
-          </p:cNvPr>
-          <p:cNvPicPr>
-            <a:picLocks noChangeAspect="1"/>
-          </p:cNvPicPr>
-          <p:nvPr/>
-        </p:nvPicPr>
-        <p:blipFill rotWithShape="1">
-          <a:blip r:embed="rId2">
-            <a:extLst>
-              <a:ext uri="{28A0092B-C50C-407E-A947-70E740481C1C}">
-                <a14:useLocalDpi xmlns:a14="http://schemas.microsoft.com/office/drawing/2010/main" val="0"/>
-              </a:ext>
-            </a:extLst>
-          </a:blip>
-          <a:srcRect l="56693" t="38913" r="41612" b="59216"/>
-          <a:stretch/>
-        </p:blipFill>
-        <p:spPr>
-          <a:xfrm>
-            <a:off x="6313803" y="2731518"/>
-            <a:ext cx="152400" cy="114300"/>
-          </a:xfrm>
-          <a:prstGeom prst="rect">
-            <a:avLst/>
-          </a:prstGeom>
-        </p:spPr>
-      </p:pic>
+        </p:grpSpPr>
+        <p:pic>
+          <p:nvPicPr>
+            <p:cNvPr id="2" name="图片 1">
+              <a:extLst>
+                <a:ext uri="{FF2B5EF4-FFF2-40B4-BE49-F238E27FC236}">
+                  <a16:creationId xmlns:a16="http://schemas.microsoft.com/office/drawing/2014/main" id="{39DC24F3-D1CB-47C0-B243-C935E4A3093E}"/>
+                </a:ext>
+              </a:extLst>
+            </p:cNvPr>
+            <p:cNvPicPr>
+              <a:picLocks noChangeAspect="1"/>
+            </p:cNvPicPr>
+            <p:nvPr/>
+          </p:nvPicPr>
+          <p:blipFill rotWithShape="1">
+            <a:blip r:embed="rId2">
+              <a:extLst>
+                <a:ext uri="{28A0092B-C50C-407E-A947-70E740481C1C}">
+                  <a14:useLocalDpi xmlns:a14="http://schemas.microsoft.com/office/drawing/2010/main" val="0"/>
+                </a:ext>
+              </a:extLst>
+            </a:blip>
+            <a:srcRect l="12811" t="34054" r="20734" b="33403"/>
+            <a:stretch/>
+          </p:blipFill>
+          <p:spPr>
+            <a:xfrm>
+              <a:off x="2246244" y="2435087"/>
+              <a:ext cx="5973417" cy="1987826"/>
+            </a:xfrm>
+            <a:prstGeom prst="rect">
+              <a:avLst/>
+            </a:prstGeom>
+          </p:spPr>
+        </p:pic>
+        <p:pic>
+          <p:nvPicPr>
+            <p:cNvPr id="3" name="图片 2">
+              <a:extLst>
+                <a:ext uri="{FF2B5EF4-FFF2-40B4-BE49-F238E27FC236}">
+                  <a16:creationId xmlns:a16="http://schemas.microsoft.com/office/drawing/2014/main" id="{905013FC-B637-4B06-A0C8-8C9073796AB3}"/>
+                </a:ext>
+              </a:extLst>
+            </p:cNvPr>
+            <p:cNvPicPr>
+              <a:picLocks noChangeAspect="1"/>
+            </p:cNvPicPr>
+            <p:nvPr/>
+          </p:nvPicPr>
+          <p:blipFill rotWithShape="1">
+            <a:blip r:embed="rId2">
+              <a:extLst>
+                <a:ext uri="{28A0092B-C50C-407E-A947-70E740481C1C}">
+                  <a14:useLocalDpi xmlns:a14="http://schemas.microsoft.com/office/drawing/2010/main" val="0"/>
+                </a:ext>
+              </a:extLst>
+            </a:blip>
+            <a:srcRect l="16994" t="38876" r="80862" b="59253"/>
+            <a:stretch/>
+          </p:blipFill>
+          <p:spPr>
+            <a:xfrm>
+              <a:off x="2813051" y="2731293"/>
+              <a:ext cx="192672" cy="114301"/>
+            </a:xfrm>
+            <a:prstGeom prst="rect">
+              <a:avLst/>
+            </a:prstGeom>
+          </p:spPr>
+        </p:pic>
+        <p:pic>
+          <p:nvPicPr>
+            <p:cNvPr id="4" name="图片 3">
+              <a:extLst>
+                <a:ext uri="{FF2B5EF4-FFF2-40B4-BE49-F238E27FC236}">
+                  <a16:creationId xmlns:a16="http://schemas.microsoft.com/office/drawing/2014/main" id="{EA2C0CF1-04AC-40D1-94E1-0F0A73E33865}"/>
+                </a:ext>
+              </a:extLst>
+            </p:cNvPr>
+            <p:cNvPicPr>
+              <a:picLocks noChangeAspect="1"/>
+            </p:cNvPicPr>
+            <p:nvPr/>
+          </p:nvPicPr>
+          <p:blipFill rotWithShape="1">
+            <a:blip r:embed="rId2">
+              <a:extLst>
+                <a:ext uri="{28A0092B-C50C-407E-A947-70E740481C1C}">
+                  <a14:useLocalDpi xmlns:a14="http://schemas.microsoft.com/office/drawing/2010/main" val="0"/>
+                </a:ext>
+              </a:extLst>
+            </a:blip>
+            <a:srcRect l="26306" t="39075" r="72237" b="59444"/>
+            <a:stretch/>
+          </p:blipFill>
+          <p:spPr>
+            <a:xfrm>
+              <a:off x="3579673" y="2743198"/>
+              <a:ext cx="130970" cy="90487"/>
+            </a:xfrm>
+            <a:prstGeom prst="rect">
+              <a:avLst/>
+            </a:prstGeom>
+          </p:spPr>
+        </p:pic>
+        <p:pic>
+          <p:nvPicPr>
+            <p:cNvPr id="5" name="图片 4">
+              <a:extLst>
+                <a:ext uri="{FF2B5EF4-FFF2-40B4-BE49-F238E27FC236}">
+                  <a16:creationId xmlns:a16="http://schemas.microsoft.com/office/drawing/2014/main" id="{65410BA3-C476-456A-93CB-D12F32F087FE}"/>
+                </a:ext>
+              </a:extLst>
+            </p:cNvPr>
+            <p:cNvPicPr>
+              <a:picLocks noChangeAspect="1"/>
+            </p:cNvPicPr>
+            <p:nvPr/>
+          </p:nvPicPr>
+          <p:blipFill rotWithShape="1">
+            <a:blip r:embed="rId2">
+              <a:extLst>
+                <a:ext uri="{28A0092B-C50C-407E-A947-70E740481C1C}">
+                  <a14:useLocalDpi xmlns:a14="http://schemas.microsoft.com/office/drawing/2010/main" val="0"/>
+                </a:ext>
+              </a:extLst>
+            </a:blip>
+            <a:srcRect l="36804" t="38876" r="61654" b="59182"/>
+            <a:stretch/>
+          </p:blipFill>
+          <p:spPr>
+            <a:xfrm>
+              <a:off x="4523792" y="2729137"/>
+              <a:ext cx="138589" cy="118607"/>
+            </a:xfrm>
+            <a:prstGeom prst="rect">
+              <a:avLst/>
+            </a:prstGeom>
+          </p:spPr>
+        </p:pic>
+        <p:pic>
+          <p:nvPicPr>
+            <p:cNvPr id="6" name="图片 5">
+              <a:extLst>
+                <a:ext uri="{FF2B5EF4-FFF2-40B4-BE49-F238E27FC236}">
+                  <a16:creationId xmlns:a16="http://schemas.microsoft.com/office/drawing/2014/main" id="{7CF457F5-9C02-4BB5-B1B1-F4012A3E4E8C}"/>
+                </a:ext>
+              </a:extLst>
+            </p:cNvPr>
+            <p:cNvPicPr>
+              <a:picLocks noChangeAspect="1"/>
+            </p:cNvPicPr>
+            <p:nvPr/>
+          </p:nvPicPr>
+          <p:blipFill rotWithShape="1">
+            <a:blip r:embed="rId2">
+              <a:extLst>
+                <a:ext uri="{28A0092B-C50C-407E-A947-70E740481C1C}">
+                  <a14:useLocalDpi xmlns:a14="http://schemas.microsoft.com/office/drawing/2010/main" val="0"/>
+                </a:ext>
+              </a:extLst>
+            </a:blip>
+            <a:srcRect l="46740" t="38884" r="51734" b="58787"/>
+            <a:stretch/>
+          </p:blipFill>
+          <p:spPr>
+            <a:xfrm>
+              <a:off x="5420702" y="2729137"/>
+              <a:ext cx="137161" cy="142276"/>
+            </a:xfrm>
+            <a:prstGeom prst="rect">
+              <a:avLst/>
+            </a:prstGeom>
+          </p:spPr>
+        </p:pic>
+        <p:pic>
+          <p:nvPicPr>
+            <p:cNvPr id="7" name="图片 6">
+              <a:extLst>
+                <a:ext uri="{FF2B5EF4-FFF2-40B4-BE49-F238E27FC236}">
+                  <a16:creationId xmlns:a16="http://schemas.microsoft.com/office/drawing/2014/main" id="{854E6A78-81F5-4242-B1CD-6CDD2A394B5B}"/>
+                </a:ext>
+              </a:extLst>
+            </p:cNvPr>
+            <p:cNvPicPr>
+              <a:picLocks noChangeAspect="1"/>
+            </p:cNvPicPr>
+            <p:nvPr/>
+          </p:nvPicPr>
+          <p:blipFill rotWithShape="1">
+            <a:blip r:embed="rId2">
+              <a:extLst>
+                <a:ext uri="{28A0092B-C50C-407E-A947-70E740481C1C}">
+                  <a14:useLocalDpi xmlns:a14="http://schemas.microsoft.com/office/drawing/2010/main" val="0"/>
+                </a:ext>
+              </a:extLst>
+            </a:blip>
+            <a:srcRect l="56693" t="38913" r="41612" b="59216"/>
+            <a:stretch/>
+          </p:blipFill>
+          <p:spPr>
+            <a:xfrm>
+              <a:off x="6313803" y="2731518"/>
+              <a:ext cx="152400" cy="114300"/>
+            </a:xfrm>
+            <a:prstGeom prst="rect">
+              <a:avLst/>
+            </a:prstGeom>
+          </p:spPr>
+        </p:pic>
+        <p:pic>
+          <p:nvPicPr>
+            <p:cNvPr id="8" name="图片 7">
+              <a:extLst>
+                <a:ext uri="{FF2B5EF4-FFF2-40B4-BE49-F238E27FC236}">
+                  <a16:creationId xmlns:a16="http://schemas.microsoft.com/office/drawing/2014/main" id="{55163D71-0E76-4E3B-A3F6-C9FB7D4578B7}"/>
+                </a:ext>
+              </a:extLst>
+            </p:cNvPr>
+            <p:cNvPicPr>
+              <a:picLocks noChangeAspect="1"/>
+            </p:cNvPicPr>
+            <p:nvPr/>
+          </p:nvPicPr>
+          <p:blipFill rotWithShape="1">
+            <a:blip r:embed="rId3">
+              <a:extLst>
+                <a:ext uri="{28A0092B-C50C-407E-A947-70E740481C1C}">
+                  <a14:useLocalDpi xmlns:a14="http://schemas.microsoft.com/office/drawing/2010/main" val="0"/>
+                </a:ext>
+              </a:extLst>
+            </a:blip>
+            <a:srcRect l="59753" t="63455" r="32281" b="34624"/>
+            <a:stretch/>
+          </p:blipFill>
+          <p:spPr>
+            <a:xfrm>
+              <a:off x="2905384" y="4262187"/>
+              <a:ext cx="729915" cy="120817"/>
+            </a:xfrm>
+            <a:prstGeom prst="rect">
+              <a:avLst/>
+            </a:prstGeom>
+          </p:spPr>
+        </p:pic>
+        <p:pic>
+          <p:nvPicPr>
+            <p:cNvPr id="9" name="图片 8">
+              <a:extLst>
+                <a:ext uri="{FF2B5EF4-FFF2-40B4-BE49-F238E27FC236}">
+                  <a16:creationId xmlns:a16="http://schemas.microsoft.com/office/drawing/2014/main" id="{1D505146-9825-4704-92AA-C10F07E20342}"/>
+                </a:ext>
+              </a:extLst>
+            </p:cNvPr>
+            <p:cNvPicPr>
+              <a:picLocks noChangeAspect="1"/>
+            </p:cNvPicPr>
+            <p:nvPr/>
+          </p:nvPicPr>
+          <p:blipFill rotWithShape="1">
+            <a:blip r:embed="rId3">
+              <a:extLst>
+                <a:ext uri="{28A0092B-C50C-407E-A947-70E740481C1C}">
+                  <a14:useLocalDpi xmlns:a14="http://schemas.microsoft.com/office/drawing/2010/main" val="0"/>
+                </a:ext>
+              </a:extLst>
+            </a:blip>
+            <a:srcRect l="59753" t="63455" r="32281" b="34624"/>
+            <a:stretch/>
+          </p:blipFill>
+          <p:spPr>
+            <a:xfrm>
+              <a:off x="3802487" y="4262187"/>
+              <a:ext cx="729915" cy="120817"/>
+            </a:xfrm>
+            <a:prstGeom prst="rect">
+              <a:avLst/>
+            </a:prstGeom>
+          </p:spPr>
+        </p:pic>
+        <p:pic>
+          <p:nvPicPr>
+            <p:cNvPr id="10" name="图片 9">
+              <a:extLst>
+                <a:ext uri="{FF2B5EF4-FFF2-40B4-BE49-F238E27FC236}">
+                  <a16:creationId xmlns:a16="http://schemas.microsoft.com/office/drawing/2014/main" id="{FA7CE810-E956-4025-9099-AD148709058C}"/>
+                </a:ext>
+              </a:extLst>
+            </p:cNvPr>
+            <p:cNvPicPr>
+              <a:picLocks noChangeAspect="1"/>
+            </p:cNvPicPr>
+            <p:nvPr/>
+          </p:nvPicPr>
+          <p:blipFill rotWithShape="1">
+            <a:blip r:embed="rId3">
+              <a:extLst>
+                <a:ext uri="{28A0092B-C50C-407E-A947-70E740481C1C}">
+                  <a14:useLocalDpi xmlns:a14="http://schemas.microsoft.com/office/drawing/2010/main" val="0"/>
+                </a:ext>
+              </a:extLst>
+            </a:blip>
+            <a:srcRect l="59753" t="63455" r="32281" b="34624"/>
+            <a:stretch/>
+          </p:blipFill>
+          <p:spPr>
+            <a:xfrm>
+              <a:off x="4699590" y="4262187"/>
+              <a:ext cx="729915" cy="120817"/>
+            </a:xfrm>
+            <a:prstGeom prst="rect">
+              <a:avLst/>
+            </a:prstGeom>
+          </p:spPr>
+        </p:pic>
+        <p:pic>
+          <p:nvPicPr>
+            <p:cNvPr id="11" name="图片 10">
+              <a:extLst>
+                <a:ext uri="{FF2B5EF4-FFF2-40B4-BE49-F238E27FC236}">
+                  <a16:creationId xmlns:a16="http://schemas.microsoft.com/office/drawing/2014/main" id="{38F7F2E5-56F1-44DF-9092-AD60F41A4F7D}"/>
+                </a:ext>
+              </a:extLst>
+            </p:cNvPr>
+            <p:cNvPicPr>
+              <a:picLocks noChangeAspect="1"/>
+            </p:cNvPicPr>
+            <p:nvPr/>
+          </p:nvPicPr>
+          <p:blipFill rotWithShape="1">
+            <a:blip r:embed="rId3">
+              <a:extLst>
+                <a:ext uri="{28A0092B-C50C-407E-A947-70E740481C1C}">
+                  <a14:useLocalDpi xmlns:a14="http://schemas.microsoft.com/office/drawing/2010/main" val="0"/>
+                </a:ext>
+              </a:extLst>
+            </a:blip>
+            <a:srcRect l="59753" t="63455" r="32281" b="34624"/>
+            <a:stretch/>
+          </p:blipFill>
+          <p:spPr>
+            <a:xfrm>
+              <a:off x="5595022" y="4262187"/>
+              <a:ext cx="729915" cy="120817"/>
+            </a:xfrm>
+            <a:prstGeom prst="rect">
+              <a:avLst/>
+            </a:prstGeom>
+          </p:spPr>
+        </p:pic>
+      </p:grpSp>
     </p:spTree>
     <p:extLst>
       <p:ext uri="{BB962C8B-B14F-4D97-AF65-F5344CB8AC3E}">
@@ -5981,216 +6303,377 @@
           <a:chExt cx="0" cy="0"/>
         </a:xfrm>
       </p:grpSpPr>
-      <p:pic>
-        <p:nvPicPr>
-          <p:cNvPr id="3" name="图片 2">
-            <a:extLst>
-              <a:ext uri="{FF2B5EF4-FFF2-40B4-BE49-F238E27FC236}">
-                <a16:creationId xmlns:a16="http://schemas.microsoft.com/office/drawing/2014/main" id="{2C3C0D60-B5BB-468C-9015-F48969EBCCED}"/>
-              </a:ext>
-            </a:extLst>
-          </p:cNvPr>
-          <p:cNvPicPr>
-            <a:picLocks noChangeAspect="1"/>
-          </p:cNvPicPr>
+      <p:grpSp>
+        <p:nvGrpSpPr>
+          <p:cNvPr id="2" name="组合 1">
+            <a:extLst>
+              <a:ext uri="{FF2B5EF4-FFF2-40B4-BE49-F238E27FC236}">
+                <a16:creationId xmlns:a16="http://schemas.microsoft.com/office/drawing/2014/main" id="{DE02F985-C527-4F45-9030-8005DA3725C6}"/>
+              </a:ext>
+            </a:extLst>
+          </p:cNvPr>
+          <p:cNvGrpSpPr/>
           <p:nvPr/>
-        </p:nvPicPr>
-        <p:blipFill rotWithShape="1">
-          <a:blip r:embed="rId2">
-            <a:extLst>
-              <a:ext uri="{28A0092B-C50C-407E-A947-70E740481C1C}">
-                <a14:useLocalDpi xmlns:a14="http://schemas.microsoft.com/office/drawing/2010/main" val="0"/>
-              </a:ext>
-            </a:extLst>
-          </a:blip>
-          <a:srcRect l="12811" t="34054" r="10671" b="33403"/>
-          <a:stretch/>
-        </p:blipFill>
-        <p:spPr>
+        </p:nvGrpSpPr>
+        <p:grpSpPr>
           <a:xfrm>
             <a:off x="2246244" y="2435087"/>
             <a:ext cx="6877878" cy="1987826"/>
+            <a:chOff x="2246244" y="2435087"/>
+            <a:chExt cx="6877878" cy="1987826"/>
           </a:xfrm>
-          <a:prstGeom prst="rect">
-            <a:avLst/>
-          </a:prstGeom>
-        </p:spPr>
-      </p:pic>
-      <p:pic>
-        <p:nvPicPr>
-          <p:cNvPr id="10" name="图片 9">
-            <a:extLst>
-              <a:ext uri="{FF2B5EF4-FFF2-40B4-BE49-F238E27FC236}">
-                <a16:creationId xmlns:a16="http://schemas.microsoft.com/office/drawing/2014/main" id="{0AE56782-5366-4806-AFB0-DB6AEA5E3858}"/>
-              </a:ext>
-            </a:extLst>
-          </p:cNvPr>
-          <p:cNvPicPr>
-            <a:picLocks noChangeAspect="1"/>
-          </p:cNvPicPr>
-          <p:nvPr/>
-        </p:nvPicPr>
-        <p:blipFill rotWithShape="1">
-          <a:blip r:embed="rId2">
-            <a:extLst>
-              <a:ext uri="{28A0092B-C50C-407E-A947-70E740481C1C}">
-                <a14:useLocalDpi xmlns:a14="http://schemas.microsoft.com/office/drawing/2010/main" val="0"/>
-              </a:ext>
-            </a:extLst>
-          </a:blip>
-          <a:srcRect l="16994" t="38876" r="80862" b="59253"/>
-          <a:stretch/>
-        </p:blipFill>
-        <p:spPr>
-          <a:xfrm>
-            <a:off x="2813051" y="2731770"/>
-            <a:ext cx="192672" cy="114301"/>
-          </a:xfrm>
-          <a:prstGeom prst="rect">
-            <a:avLst/>
-          </a:prstGeom>
-        </p:spPr>
-      </p:pic>
-      <p:pic>
-        <p:nvPicPr>
-          <p:cNvPr id="11" name="图片 10">
-            <a:extLst>
-              <a:ext uri="{FF2B5EF4-FFF2-40B4-BE49-F238E27FC236}">
-                <a16:creationId xmlns:a16="http://schemas.microsoft.com/office/drawing/2014/main" id="{27525582-9746-4339-AD56-A873F8608B30}"/>
-              </a:ext>
-            </a:extLst>
-          </p:cNvPr>
-          <p:cNvPicPr>
-            <a:picLocks noChangeAspect="1"/>
-          </p:cNvPicPr>
-          <p:nvPr/>
-        </p:nvPicPr>
-        <p:blipFill rotWithShape="1">
-          <a:blip r:embed="rId2">
-            <a:extLst>
-              <a:ext uri="{28A0092B-C50C-407E-A947-70E740481C1C}">
-                <a14:useLocalDpi xmlns:a14="http://schemas.microsoft.com/office/drawing/2010/main" val="0"/>
-              </a:ext>
-            </a:extLst>
-          </a:blip>
-          <a:srcRect l="26306" t="39075" r="72237" b="59444"/>
-          <a:stretch/>
-        </p:blipFill>
-        <p:spPr>
-          <a:xfrm>
-            <a:off x="3579673" y="2743675"/>
-            <a:ext cx="130970" cy="90487"/>
-          </a:xfrm>
-          <a:prstGeom prst="rect">
-            <a:avLst/>
-          </a:prstGeom>
-        </p:spPr>
-      </p:pic>
-      <p:pic>
-        <p:nvPicPr>
-          <p:cNvPr id="12" name="图片 11">
-            <a:extLst>
-              <a:ext uri="{FF2B5EF4-FFF2-40B4-BE49-F238E27FC236}">
-                <a16:creationId xmlns:a16="http://schemas.microsoft.com/office/drawing/2014/main" id="{6FFB7798-CEEA-431A-9061-FBB52E1EA33E}"/>
-              </a:ext>
-            </a:extLst>
-          </p:cNvPr>
-          <p:cNvPicPr>
-            <a:picLocks noChangeAspect="1"/>
-          </p:cNvPicPr>
-          <p:nvPr/>
-        </p:nvPicPr>
-        <p:blipFill rotWithShape="1">
-          <a:blip r:embed="rId2">
-            <a:extLst>
-              <a:ext uri="{28A0092B-C50C-407E-A947-70E740481C1C}">
-                <a14:useLocalDpi xmlns:a14="http://schemas.microsoft.com/office/drawing/2010/main" val="0"/>
-              </a:ext>
-            </a:extLst>
-          </a:blip>
-          <a:srcRect l="36804" t="38876" r="61654" b="59182"/>
-          <a:stretch/>
-        </p:blipFill>
-        <p:spPr>
-          <a:xfrm>
-            <a:off x="4523792" y="2729614"/>
-            <a:ext cx="138589" cy="118607"/>
-          </a:xfrm>
-          <a:prstGeom prst="rect">
-            <a:avLst/>
-          </a:prstGeom>
-        </p:spPr>
-      </p:pic>
-      <p:pic>
-        <p:nvPicPr>
-          <p:cNvPr id="13" name="图片 12">
-            <a:extLst>
-              <a:ext uri="{FF2B5EF4-FFF2-40B4-BE49-F238E27FC236}">
-                <a16:creationId xmlns:a16="http://schemas.microsoft.com/office/drawing/2014/main" id="{B7EAEA5D-7A6A-4642-A7A3-BA1FDE4B3B89}"/>
-              </a:ext>
-            </a:extLst>
-          </p:cNvPr>
-          <p:cNvPicPr>
-            <a:picLocks noChangeAspect="1"/>
-          </p:cNvPicPr>
-          <p:nvPr/>
-        </p:nvPicPr>
-        <p:blipFill rotWithShape="1">
-          <a:blip r:embed="rId2">
-            <a:extLst>
-              <a:ext uri="{28A0092B-C50C-407E-A947-70E740481C1C}">
-                <a14:useLocalDpi xmlns:a14="http://schemas.microsoft.com/office/drawing/2010/main" val="0"/>
-              </a:ext>
-            </a:extLst>
-          </a:blip>
-          <a:srcRect l="46740" t="38884" r="51734" b="58787"/>
-          <a:stretch/>
-        </p:blipFill>
-        <p:spPr>
-          <a:xfrm>
-            <a:off x="5420702" y="2729614"/>
-            <a:ext cx="137161" cy="142276"/>
-          </a:xfrm>
-          <a:prstGeom prst="rect">
-            <a:avLst/>
-          </a:prstGeom>
-        </p:spPr>
-      </p:pic>
-      <p:pic>
-        <p:nvPicPr>
-          <p:cNvPr id="14" name="图片 13">
-            <a:extLst>
-              <a:ext uri="{FF2B5EF4-FFF2-40B4-BE49-F238E27FC236}">
-                <a16:creationId xmlns:a16="http://schemas.microsoft.com/office/drawing/2014/main" id="{A4D1D036-292A-4EEE-8DAD-384118274937}"/>
-              </a:ext>
-            </a:extLst>
-          </p:cNvPr>
-          <p:cNvPicPr>
-            <a:picLocks noChangeAspect="1"/>
-          </p:cNvPicPr>
-          <p:nvPr/>
-        </p:nvPicPr>
-        <p:blipFill rotWithShape="1">
-          <a:blip r:embed="rId2">
-            <a:extLst>
-              <a:ext uri="{28A0092B-C50C-407E-A947-70E740481C1C}">
-                <a14:useLocalDpi xmlns:a14="http://schemas.microsoft.com/office/drawing/2010/main" val="0"/>
-              </a:ext>
-            </a:extLst>
-          </a:blip>
-          <a:srcRect l="56693" t="38913" r="41612" b="59216"/>
-          <a:stretch/>
-        </p:blipFill>
-        <p:spPr>
-          <a:xfrm>
-            <a:off x="6313803" y="2731995"/>
-            <a:ext cx="152400" cy="114300"/>
-          </a:xfrm>
-          <a:prstGeom prst="rect">
-            <a:avLst/>
-          </a:prstGeom>
-        </p:spPr>
-      </p:pic>
+        </p:grpSpPr>
+        <p:pic>
+          <p:nvPicPr>
+            <p:cNvPr id="3" name="图片 2">
+              <a:extLst>
+                <a:ext uri="{FF2B5EF4-FFF2-40B4-BE49-F238E27FC236}">
+                  <a16:creationId xmlns:a16="http://schemas.microsoft.com/office/drawing/2014/main" id="{2C3C0D60-B5BB-468C-9015-F48969EBCCED}"/>
+                </a:ext>
+              </a:extLst>
+            </p:cNvPr>
+            <p:cNvPicPr>
+              <a:picLocks noChangeAspect="1"/>
+            </p:cNvPicPr>
+            <p:nvPr/>
+          </p:nvPicPr>
+          <p:blipFill rotWithShape="1">
+            <a:blip r:embed="rId2">
+              <a:extLst>
+                <a:ext uri="{28A0092B-C50C-407E-A947-70E740481C1C}">
+                  <a14:useLocalDpi xmlns:a14="http://schemas.microsoft.com/office/drawing/2010/main" val="0"/>
+                </a:ext>
+              </a:extLst>
+            </a:blip>
+            <a:srcRect l="12811" t="34054" r="10671" b="33403"/>
+            <a:stretch/>
+          </p:blipFill>
+          <p:spPr>
+            <a:xfrm>
+              <a:off x="2246244" y="2435087"/>
+              <a:ext cx="6877878" cy="1987826"/>
+            </a:xfrm>
+            <a:prstGeom prst="rect">
+              <a:avLst/>
+            </a:prstGeom>
+          </p:spPr>
+        </p:pic>
+        <p:pic>
+          <p:nvPicPr>
+            <p:cNvPr id="10" name="图片 9">
+              <a:extLst>
+                <a:ext uri="{FF2B5EF4-FFF2-40B4-BE49-F238E27FC236}">
+                  <a16:creationId xmlns:a16="http://schemas.microsoft.com/office/drawing/2014/main" id="{0AE56782-5366-4806-AFB0-DB6AEA5E3858}"/>
+                </a:ext>
+              </a:extLst>
+            </p:cNvPr>
+            <p:cNvPicPr>
+              <a:picLocks noChangeAspect="1"/>
+            </p:cNvPicPr>
+            <p:nvPr/>
+          </p:nvPicPr>
+          <p:blipFill rotWithShape="1">
+            <a:blip r:embed="rId2">
+              <a:extLst>
+                <a:ext uri="{28A0092B-C50C-407E-A947-70E740481C1C}">
+                  <a14:useLocalDpi xmlns:a14="http://schemas.microsoft.com/office/drawing/2010/main" val="0"/>
+                </a:ext>
+              </a:extLst>
+            </a:blip>
+            <a:srcRect l="16994" t="38876" r="80862" b="59253"/>
+            <a:stretch/>
+          </p:blipFill>
+          <p:spPr>
+            <a:xfrm>
+              <a:off x="2813051" y="2731770"/>
+              <a:ext cx="192672" cy="114301"/>
+            </a:xfrm>
+            <a:prstGeom prst="rect">
+              <a:avLst/>
+            </a:prstGeom>
+          </p:spPr>
+        </p:pic>
+        <p:pic>
+          <p:nvPicPr>
+            <p:cNvPr id="11" name="图片 10">
+              <a:extLst>
+                <a:ext uri="{FF2B5EF4-FFF2-40B4-BE49-F238E27FC236}">
+                  <a16:creationId xmlns:a16="http://schemas.microsoft.com/office/drawing/2014/main" id="{27525582-9746-4339-AD56-A873F8608B30}"/>
+                </a:ext>
+              </a:extLst>
+            </p:cNvPr>
+            <p:cNvPicPr>
+              <a:picLocks noChangeAspect="1"/>
+            </p:cNvPicPr>
+            <p:nvPr/>
+          </p:nvPicPr>
+          <p:blipFill rotWithShape="1">
+            <a:blip r:embed="rId2">
+              <a:extLst>
+                <a:ext uri="{28A0092B-C50C-407E-A947-70E740481C1C}">
+                  <a14:useLocalDpi xmlns:a14="http://schemas.microsoft.com/office/drawing/2010/main" val="0"/>
+                </a:ext>
+              </a:extLst>
+            </a:blip>
+            <a:srcRect l="26306" t="39075" r="72237" b="59444"/>
+            <a:stretch/>
+          </p:blipFill>
+          <p:spPr>
+            <a:xfrm>
+              <a:off x="3579673" y="2743675"/>
+              <a:ext cx="130970" cy="90487"/>
+            </a:xfrm>
+            <a:prstGeom prst="rect">
+              <a:avLst/>
+            </a:prstGeom>
+          </p:spPr>
+        </p:pic>
+        <p:pic>
+          <p:nvPicPr>
+            <p:cNvPr id="12" name="图片 11">
+              <a:extLst>
+                <a:ext uri="{FF2B5EF4-FFF2-40B4-BE49-F238E27FC236}">
+                  <a16:creationId xmlns:a16="http://schemas.microsoft.com/office/drawing/2014/main" id="{6FFB7798-CEEA-431A-9061-FBB52E1EA33E}"/>
+                </a:ext>
+              </a:extLst>
+            </p:cNvPr>
+            <p:cNvPicPr>
+              <a:picLocks noChangeAspect="1"/>
+            </p:cNvPicPr>
+            <p:nvPr/>
+          </p:nvPicPr>
+          <p:blipFill rotWithShape="1">
+            <a:blip r:embed="rId2">
+              <a:extLst>
+                <a:ext uri="{28A0092B-C50C-407E-A947-70E740481C1C}">
+                  <a14:useLocalDpi xmlns:a14="http://schemas.microsoft.com/office/drawing/2010/main" val="0"/>
+                </a:ext>
+              </a:extLst>
+            </a:blip>
+            <a:srcRect l="36804" t="38876" r="61654" b="59182"/>
+            <a:stretch/>
+          </p:blipFill>
+          <p:spPr>
+            <a:xfrm>
+              <a:off x="4523792" y="2729614"/>
+              <a:ext cx="138589" cy="118607"/>
+            </a:xfrm>
+            <a:prstGeom prst="rect">
+              <a:avLst/>
+            </a:prstGeom>
+          </p:spPr>
+        </p:pic>
+        <p:pic>
+          <p:nvPicPr>
+            <p:cNvPr id="13" name="图片 12">
+              <a:extLst>
+                <a:ext uri="{FF2B5EF4-FFF2-40B4-BE49-F238E27FC236}">
+                  <a16:creationId xmlns:a16="http://schemas.microsoft.com/office/drawing/2014/main" id="{B7EAEA5D-7A6A-4642-A7A3-BA1FDE4B3B89}"/>
+                </a:ext>
+              </a:extLst>
+            </p:cNvPr>
+            <p:cNvPicPr>
+              <a:picLocks noChangeAspect="1"/>
+            </p:cNvPicPr>
+            <p:nvPr/>
+          </p:nvPicPr>
+          <p:blipFill rotWithShape="1">
+            <a:blip r:embed="rId2">
+              <a:extLst>
+                <a:ext uri="{28A0092B-C50C-407E-A947-70E740481C1C}">
+                  <a14:useLocalDpi xmlns:a14="http://schemas.microsoft.com/office/drawing/2010/main" val="0"/>
+                </a:ext>
+              </a:extLst>
+            </a:blip>
+            <a:srcRect l="46740" t="38884" r="51734" b="58787"/>
+            <a:stretch/>
+          </p:blipFill>
+          <p:spPr>
+            <a:xfrm>
+              <a:off x="5420702" y="2729614"/>
+              <a:ext cx="137161" cy="142276"/>
+            </a:xfrm>
+            <a:prstGeom prst="rect">
+              <a:avLst/>
+            </a:prstGeom>
+          </p:spPr>
+        </p:pic>
+        <p:pic>
+          <p:nvPicPr>
+            <p:cNvPr id="14" name="图片 13">
+              <a:extLst>
+                <a:ext uri="{FF2B5EF4-FFF2-40B4-BE49-F238E27FC236}">
+                  <a16:creationId xmlns:a16="http://schemas.microsoft.com/office/drawing/2014/main" id="{A4D1D036-292A-4EEE-8DAD-384118274937}"/>
+                </a:ext>
+              </a:extLst>
+            </p:cNvPr>
+            <p:cNvPicPr>
+              <a:picLocks noChangeAspect="1"/>
+            </p:cNvPicPr>
+            <p:nvPr/>
+          </p:nvPicPr>
+          <p:blipFill rotWithShape="1">
+            <a:blip r:embed="rId2">
+              <a:extLst>
+                <a:ext uri="{28A0092B-C50C-407E-A947-70E740481C1C}">
+                  <a14:useLocalDpi xmlns:a14="http://schemas.microsoft.com/office/drawing/2010/main" val="0"/>
+                </a:ext>
+              </a:extLst>
+            </a:blip>
+            <a:srcRect l="56693" t="38913" r="41612" b="59216"/>
+            <a:stretch/>
+          </p:blipFill>
+          <p:spPr>
+            <a:xfrm>
+              <a:off x="6313803" y="2731995"/>
+              <a:ext cx="152400" cy="114300"/>
+            </a:xfrm>
+            <a:prstGeom prst="rect">
+              <a:avLst/>
+            </a:prstGeom>
+          </p:spPr>
+        </p:pic>
+        <p:pic>
+          <p:nvPicPr>
+            <p:cNvPr id="8" name="图片 7">
+              <a:extLst>
+                <a:ext uri="{FF2B5EF4-FFF2-40B4-BE49-F238E27FC236}">
+                  <a16:creationId xmlns:a16="http://schemas.microsoft.com/office/drawing/2014/main" id="{FEE17F4D-76C4-401B-9C23-E2B8EB77C746}"/>
+                </a:ext>
+              </a:extLst>
+            </p:cNvPr>
+            <p:cNvPicPr>
+              <a:picLocks noChangeAspect="1"/>
+            </p:cNvPicPr>
+            <p:nvPr/>
+          </p:nvPicPr>
+          <p:blipFill rotWithShape="1">
+            <a:blip r:embed="rId3">
+              <a:extLst>
+                <a:ext uri="{28A0092B-C50C-407E-A947-70E740481C1C}">
+                  <a14:useLocalDpi xmlns:a14="http://schemas.microsoft.com/office/drawing/2010/main" val="0"/>
+                </a:ext>
+              </a:extLst>
+            </a:blip>
+            <a:srcRect l="59753" t="63455" r="32281" b="34624"/>
+            <a:stretch/>
+          </p:blipFill>
+          <p:spPr>
+            <a:xfrm>
+              <a:off x="2905384" y="4262187"/>
+              <a:ext cx="729915" cy="120817"/>
+            </a:xfrm>
+            <a:prstGeom prst="rect">
+              <a:avLst/>
+            </a:prstGeom>
+          </p:spPr>
+        </p:pic>
+        <p:pic>
+          <p:nvPicPr>
+            <p:cNvPr id="9" name="图片 8">
+              <a:extLst>
+                <a:ext uri="{FF2B5EF4-FFF2-40B4-BE49-F238E27FC236}">
+                  <a16:creationId xmlns:a16="http://schemas.microsoft.com/office/drawing/2014/main" id="{9C939457-F8E2-47F2-AF6A-AD67684164A5}"/>
+                </a:ext>
+              </a:extLst>
+            </p:cNvPr>
+            <p:cNvPicPr>
+              <a:picLocks noChangeAspect="1"/>
+            </p:cNvPicPr>
+            <p:nvPr/>
+          </p:nvPicPr>
+          <p:blipFill rotWithShape="1">
+            <a:blip r:embed="rId3">
+              <a:extLst>
+                <a:ext uri="{28A0092B-C50C-407E-A947-70E740481C1C}">
+                  <a14:useLocalDpi xmlns:a14="http://schemas.microsoft.com/office/drawing/2010/main" val="0"/>
+                </a:ext>
+              </a:extLst>
+            </a:blip>
+            <a:srcRect l="59753" t="63455" r="32281" b="34624"/>
+            <a:stretch/>
+          </p:blipFill>
+          <p:spPr>
+            <a:xfrm>
+              <a:off x="3802487" y="4262187"/>
+              <a:ext cx="729915" cy="120817"/>
+            </a:xfrm>
+            <a:prstGeom prst="rect">
+              <a:avLst/>
+            </a:prstGeom>
+          </p:spPr>
+        </p:pic>
+        <p:pic>
+          <p:nvPicPr>
+            <p:cNvPr id="15" name="图片 14">
+              <a:extLst>
+                <a:ext uri="{FF2B5EF4-FFF2-40B4-BE49-F238E27FC236}">
+                  <a16:creationId xmlns:a16="http://schemas.microsoft.com/office/drawing/2014/main" id="{B3959E98-C2D3-48E7-A2C9-7C2BDA7DFD31}"/>
+                </a:ext>
+              </a:extLst>
+            </p:cNvPr>
+            <p:cNvPicPr>
+              <a:picLocks noChangeAspect="1"/>
+            </p:cNvPicPr>
+            <p:nvPr/>
+          </p:nvPicPr>
+          <p:blipFill rotWithShape="1">
+            <a:blip r:embed="rId3">
+              <a:extLst>
+                <a:ext uri="{28A0092B-C50C-407E-A947-70E740481C1C}">
+                  <a14:useLocalDpi xmlns:a14="http://schemas.microsoft.com/office/drawing/2010/main" val="0"/>
+                </a:ext>
+              </a:extLst>
+            </a:blip>
+            <a:srcRect l="59753" t="63455" r="32281" b="34624"/>
+            <a:stretch/>
+          </p:blipFill>
+          <p:spPr>
+            <a:xfrm>
+              <a:off x="4699590" y="4262187"/>
+              <a:ext cx="729915" cy="120817"/>
+            </a:xfrm>
+            <a:prstGeom prst="rect">
+              <a:avLst/>
+            </a:prstGeom>
+          </p:spPr>
+        </p:pic>
+        <p:pic>
+          <p:nvPicPr>
+            <p:cNvPr id="16" name="图片 15">
+              <a:extLst>
+                <a:ext uri="{FF2B5EF4-FFF2-40B4-BE49-F238E27FC236}">
+                  <a16:creationId xmlns:a16="http://schemas.microsoft.com/office/drawing/2014/main" id="{C52880C8-6E58-40D1-8538-EB6CDCFF6A36}"/>
+                </a:ext>
+              </a:extLst>
+            </p:cNvPr>
+            <p:cNvPicPr>
+              <a:picLocks noChangeAspect="1"/>
+            </p:cNvPicPr>
+            <p:nvPr/>
+          </p:nvPicPr>
+          <p:blipFill rotWithShape="1">
+            <a:blip r:embed="rId3">
+              <a:extLst>
+                <a:ext uri="{28A0092B-C50C-407E-A947-70E740481C1C}">
+                  <a14:useLocalDpi xmlns:a14="http://schemas.microsoft.com/office/drawing/2010/main" val="0"/>
+                </a:ext>
+              </a:extLst>
+            </a:blip>
+            <a:srcRect l="59753" t="63455" r="32281" b="34624"/>
+            <a:stretch/>
+          </p:blipFill>
+          <p:spPr>
+            <a:xfrm>
+              <a:off x="5595022" y="4262187"/>
+              <a:ext cx="729915" cy="120817"/>
+            </a:xfrm>
+            <a:prstGeom prst="rect">
+              <a:avLst/>
+            </a:prstGeom>
+          </p:spPr>
+        </p:pic>
+      </p:grpSp>
     </p:spTree>
     <p:extLst>
       <p:ext uri="{BB962C8B-B14F-4D97-AF65-F5344CB8AC3E}">
@@ -6399,10 +6882,10 @@
       </p:grpSpPr>
       <p:grpSp>
         <p:nvGrpSpPr>
-          <p:cNvPr id="10" name="组合 9">
-            <a:extLst>
-              <a:ext uri="{FF2B5EF4-FFF2-40B4-BE49-F238E27FC236}">
-                <a16:creationId xmlns:a16="http://schemas.microsoft.com/office/drawing/2014/main" id="{11457EA7-87ED-4B29-8E41-1004EDAB4E95}"/>
+          <p:cNvPr id="2" name="组合 1">
+            <a:extLst>
+              <a:ext uri="{FF2B5EF4-FFF2-40B4-BE49-F238E27FC236}">
+                <a16:creationId xmlns:a16="http://schemas.microsoft.com/office/drawing/2014/main" id="{D82F74C6-C102-4AC9-A096-8F1C6326EA4E}"/>
               </a:ext>
             </a:extLst>
           </p:cNvPr>
@@ -6417,12 +6900,243 @@
             <a:chExt cx="6972442" cy="2047461"/>
           </a:xfrm>
         </p:grpSpPr>
+        <p:grpSp>
+          <p:nvGrpSpPr>
+            <p:cNvPr id="10" name="组合 9">
+              <a:extLst>
+                <a:ext uri="{FF2B5EF4-FFF2-40B4-BE49-F238E27FC236}">
+                  <a16:creationId xmlns:a16="http://schemas.microsoft.com/office/drawing/2014/main" id="{11457EA7-87ED-4B29-8E41-1004EDAB4E95}"/>
+                </a:ext>
+              </a:extLst>
+            </p:cNvPr>
+            <p:cNvGrpSpPr/>
+            <p:nvPr/>
+          </p:nvGrpSpPr>
+          <p:grpSpPr>
+            <a:xfrm>
+              <a:off x="2451376" y="2415761"/>
+              <a:ext cx="6972442" cy="2047461"/>
+              <a:chOff x="2451376" y="2415761"/>
+              <a:chExt cx="6972442" cy="2047461"/>
+            </a:xfrm>
+          </p:grpSpPr>
+          <p:pic>
+            <p:nvPicPr>
+              <p:cNvPr id="4" name="图片 3">
+                <a:extLst>
+                  <a:ext uri="{FF2B5EF4-FFF2-40B4-BE49-F238E27FC236}">
+                    <a16:creationId xmlns:a16="http://schemas.microsoft.com/office/drawing/2014/main" id="{87E104F2-3F7B-4BC5-BB90-B49919AD7E9B}"/>
+                  </a:ext>
+                </a:extLst>
+              </p:cNvPr>
+              <p:cNvPicPr>
+                <a:picLocks noChangeAspect="1"/>
+              </p:cNvPicPr>
+              <p:nvPr/>
+            </p:nvPicPr>
+            <p:blipFill rotWithShape="1">
+              <a:blip r:embed="rId2">
+                <a:extLst>
+                  <a:ext uri="{28A0092B-C50C-407E-A947-70E740481C1C}">
+                    <a14:useLocalDpi xmlns:a14="http://schemas.microsoft.com/office/drawing/2010/main" val="0"/>
+                  </a:ext>
+                </a:extLst>
+              </a:blip>
+              <a:srcRect l="12245" t="34194" r="7643" b="31425"/>
+              <a:stretch/>
+            </p:blipFill>
+            <p:spPr>
+              <a:xfrm>
+                <a:off x="2451376" y="2415761"/>
+                <a:ext cx="6972442" cy="2047461"/>
+              </a:xfrm>
+              <a:prstGeom prst="rect">
+                <a:avLst/>
+              </a:prstGeom>
+            </p:spPr>
+          </p:pic>
+          <p:pic>
+            <p:nvPicPr>
+              <p:cNvPr id="5" name="图片 4">
+                <a:extLst>
+                  <a:ext uri="{FF2B5EF4-FFF2-40B4-BE49-F238E27FC236}">
+                    <a16:creationId xmlns:a16="http://schemas.microsoft.com/office/drawing/2014/main" id="{03BDB5CF-D1AA-4373-A92C-EE5D70EE7F01}"/>
+                  </a:ext>
+                </a:extLst>
+              </p:cNvPr>
+              <p:cNvPicPr>
+                <a:picLocks noChangeAspect="1"/>
+              </p:cNvPicPr>
+              <p:nvPr/>
+            </p:nvPicPr>
+            <p:blipFill rotWithShape="1">
+              <a:blip r:embed="rId3">
+                <a:extLst>
+                  <a:ext uri="{28A0092B-C50C-407E-A947-70E740481C1C}">
+                    <a14:useLocalDpi xmlns:a14="http://schemas.microsoft.com/office/drawing/2010/main" val="0"/>
+                  </a:ext>
+                </a:extLst>
+              </a:blip>
+              <a:srcRect l="16994" t="38876" r="80862" b="59253"/>
+              <a:stretch/>
+            </p:blipFill>
+            <p:spPr>
+              <a:xfrm>
+                <a:off x="3094041" y="2731293"/>
+                <a:ext cx="192672" cy="114301"/>
+              </a:xfrm>
+              <a:prstGeom prst="rect">
+                <a:avLst/>
+              </a:prstGeom>
+            </p:spPr>
+          </p:pic>
+          <p:pic>
+            <p:nvPicPr>
+              <p:cNvPr id="6" name="图片 5">
+                <a:extLst>
+                  <a:ext uri="{FF2B5EF4-FFF2-40B4-BE49-F238E27FC236}">
+                    <a16:creationId xmlns:a16="http://schemas.microsoft.com/office/drawing/2014/main" id="{3A6F43CA-10B9-4889-8E9F-B2F4105763A7}"/>
+                  </a:ext>
+                </a:extLst>
+              </p:cNvPr>
+              <p:cNvPicPr>
+                <a:picLocks noChangeAspect="1"/>
+              </p:cNvPicPr>
+              <p:nvPr/>
+            </p:nvPicPr>
+            <p:blipFill rotWithShape="1">
+              <a:blip r:embed="rId3">
+                <a:extLst>
+                  <a:ext uri="{28A0092B-C50C-407E-A947-70E740481C1C}">
+                    <a14:useLocalDpi xmlns:a14="http://schemas.microsoft.com/office/drawing/2010/main" val="0"/>
+                  </a:ext>
+                </a:extLst>
+              </a:blip>
+              <a:srcRect l="26306" t="39075" r="72237" b="59444"/>
+              <a:stretch/>
+            </p:blipFill>
+            <p:spPr>
+              <a:xfrm>
+                <a:off x="3857487" y="2740634"/>
+                <a:ext cx="142299" cy="98314"/>
+              </a:xfrm>
+              <a:prstGeom prst="rect">
+                <a:avLst/>
+              </a:prstGeom>
+            </p:spPr>
+          </p:pic>
+          <p:pic>
+            <p:nvPicPr>
+              <p:cNvPr id="7" name="图片 6">
+                <a:extLst>
+                  <a:ext uri="{FF2B5EF4-FFF2-40B4-BE49-F238E27FC236}">
+                    <a16:creationId xmlns:a16="http://schemas.microsoft.com/office/drawing/2014/main" id="{EA969411-3D55-48B8-BB13-0BF148051255}"/>
+                  </a:ext>
+                </a:extLst>
+              </p:cNvPr>
+              <p:cNvPicPr>
+                <a:picLocks noChangeAspect="1"/>
+              </p:cNvPicPr>
+              <p:nvPr/>
+            </p:nvPicPr>
+            <p:blipFill rotWithShape="1">
+              <a:blip r:embed="rId3">
+                <a:extLst>
+                  <a:ext uri="{28A0092B-C50C-407E-A947-70E740481C1C}">
+                    <a14:useLocalDpi xmlns:a14="http://schemas.microsoft.com/office/drawing/2010/main" val="0"/>
+                  </a:ext>
+                </a:extLst>
+              </a:blip>
+              <a:srcRect l="36804" t="38876" r="61654" b="59182"/>
+              <a:stretch/>
+            </p:blipFill>
+            <p:spPr>
+              <a:xfrm>
+                <a:off x="4804782" y="2729136"/>
+                <a:ext cx="142300" cy="121783"/>
+              </a:xfrm>
+              <a:prstGeom prst="rect">
+                <a:avLst/>
+              </a:prstGeom>
+            </p:spPr>
+          </p:pic>
+          <p:pic>
+            <p:nvPicPr>
+              <p:cNvPr id="8" name="图片 7">
+                <a:extLst>
+                  <a:ext uri="{FF2B5EF4-FFF2-40B4-BE49-F238E27FC236}">
+                    <a16:creationId xmlns:a16="http://schemas.microsoft.com/office/drawing/2014/main" id="{A7BAAA58-DD56-463F-B1AF-4663D71D9B1F}"/>
+                  </a:ext>
+                </a:extLst>
+              </p:cNvPr>
+              <p:cNvPicPr>
+                <a:picLocks noChangeAspect="1"/>
+              </p:cNvPicPr>
+              <p:nvPr/>
+            </p:nvPicPr>
+            <p:blipFill rotWithShape="1">
+              <a:blip r:embed="rId3">
+                <a:extLst>
+                  <a:ext uri="{28A0092B-C50C-407E-A947-70E740481C1C}">
+                    <a14:useLocalDpi xmlns:a14="http://schemas.microsoft.com/office/drawing/2010/main" val="0"/>
+                  </a:ext>
+                </a:extLst>
+              </a:blip>
+              <a:srcRect l="46740" t="38884" r="51734" b="58787"/>
+              <a:stretch/>
+            </p:blipFill>
+            <p:spPr>
+              <a:xfrm>
+                <a:off x="5708042" y="2722566"/>
+                <a:ext cx="154570" cy="160334"/>
+              </a:xfrm>
+              <a:prstGeom prst="rect">
+                <a:avLst/>
+              </a:prstGeom>
+            </p:spPr>
+          </p:pic>
+          <p:pic>
+            <p:nvPicPr>
+              <p:cNvPr id="9" name="图片 8">
+                <a:extLst>
+                  <a:ext uri="{FF2B5EF4-FFF2-40B4-BE49-F238E27FC236}">
+                    <a16:creationId xmlns:a16="http://schemas.microsoft.com/office/drawing/2014/main" id="{540F3FEE-8CAE-4ADE-B854-85EA038B1A86}"/>
+                  </a:ext>
+                </a:extLst>
+              </p:cNvPr>
+              <p:cNvPicPr>
+                <a:picLocks noChangeAspect="1"/>
+              </p:cNvPicPr>
+              <p:nvPr/>
+            </p:nvPicPr>
+            <p:blipFill rotWithShape="1">
+              <a:blip r:embed="rId3">
+                <a:extLst>
+                  <a:ext uri="{28A0092B-C50C-407E-A947-70E740481C1C}">
+                    <a14:useLocalDpi xmlns:a14="http://schemas.microsoft.com/office/drawing/2010/main" val="0"/>
+                  </a:ext>
+                </a:extLst>
+              </a:blip>
+              <a:srcRect l="56693" t="38913" r="41612" b="59216"/>
+              <a:stretch/>
+            </p:blipFill>
+            <p:spPr>
+              <a:xfrm>
+                <a:off x="6598957" y="2729136"/>
+                <a:ext cx="156386" cy="117289"/>
+              </a:xfrm>
+              <a:prstGeom prst="rect">
+                <a:avLst/>
+              </a:prstGeom>
+            </p:spPr>
+          </p:pic>
+        </p:grpSp>
         <p:pic>
           <p:nvPicPr>
-            <p:cNvPr id="4" name="图片 3">
+            <p:cNvPr id="11" name="图片 10">
               <a:extLst>
                 <a:ext uri="{FF2B5EF4-FFF2-40B4-BE49-F238E27FC236}">
-                  <a16:creationId xmlns:a16="http://schemas.microsoft.com/office/drawing/2014/main" id="{87E104F2-3F7B-4BC5-BB90-B49919AD7E9B}"/>
+                  <a16:creationId xmlns:a16="http://schemas.microsoft.com/office/drawing/2014/main" id="{C1A3D78B-7A03-412F-9E6C-EB0582AE701C}"/>
                 </a:ext>
               </a:extLst>
             </p:cNvPr>
@@ -6432,20 +7146,20 @@
             <p:nvPr/>
           </p:nvPicPr>
           <p:blipFill rotWithShape="1">
-            <a:blip r:embed="rId2">
+            <a:blip r:embed="rId4">
               <a:extLst>
                 <a:ext uri="{28A0092B-C50C-407E-A947-70E740481C1C}">
                   <a14:useLocalDpi xmlns:a14="http://schemas.microsoft.com/office/drawing/2010/main" val="0"/>
                 </a:ext>
               </a:extLst>
             </a:blip>
-            <a:srcRect l="12245" t="34194" r="7643" b="31425"/>
+            <a:srcRect l="59753" t="63455" r="32281" b="34624"/>
             <a:stretch/>
           </p:blipFill>
           <p:spPr>
             <a:xfrm>
-              <a:off x="2451376" y="2415761"/>
-              <a:ext cx="6972442" cy="2047461"/>
+              <a:off x="3146014" y="4270208"/>
+              <a:ext cx="729915" cy="120817"/>
             </a:xfrm>
             <a:prstGeom prst="rect">
               <a:avLst/>
@@ -6454,10 +7168,10 @@
         </p:pic>
         <p:pic>
           <p:nvPicPr>
-            <p:cNvPr id="5" name="图片 4">
+            <p:cNvPr id="12" name="图片 11">
               <a:extLst>
                 <a:ext uri="{FF2B5EF4-FFF2-40B4-BE49-F238E27FC236}">
-                  <a16:creationId xmlns:a16="http://schemas.microsoft.com/office/drawing/2014/main" id="{03BDB5CF-D1AA-4373-A92C-EE5D70EE7F01}"/>
+                  <a16:creationId xmlns:a16="http://schemas.microsoft.com/office/drawing/2014/main" id="{6CE29492-E115-458A-9C56-8A869C99DC81}"/>
                 </a:ext>
               </a:extLst>
             </p:cNvPr>
@@ -6467,20 +7181,20 @@
             <p:nvPr/>
           </p:nvPicPr>
           <p:blipFill rotWithShape="1">
-            <a:blip r:embed="rId3">
+            <a:blip r:embed="rId4">
               <a:extLst>
                 <a:ext uri="{28A0092B-C50C-407E-A947-70E740481C1C}">
                   <a14:useLocalDpi xmlns:a14="http://schemas.microsoft.com/office/drawing/2010/main" val="0"/>
                 </a:ext>
               </a:extLst>
             </a:blip>
-            <a:srcRect l="16994" t="38876" r="80862" b="59253"/>
+            <a:srcRect l="59753" t="63455" r="32281" b="34624"/>
             <a:stretch/>
           </p:blipFill>
           <p:spPr>
             <a:xfrm>
-              <a:off x="3094041" y="2731293"/>
-              <a:ext cx="192672" cy="114301"/>
+              <a:off x="4043117" y="4270208"/>
+              <a:ext cx="729915" cy="120817"/>
             </a:xfrm>
             <a:prstGeom prst="rect">
               <a:avLst/>
@@ -6489,10 +7203,10 @@
         </p:pic>
         <p:pic>
           <p:nvPicPr>
-            <p:cNvPr id="6" name="图片 5">
+            <p:cNvPr id="13" name="图片 12">
               <a:extLst>
                 <a:ext uri="{FF2B5EF4-FFF2-40B4-BE49-F238E27FC236}">
-                  <a16:creationId xmlns:a16="http://schemas.microsoft.com/office/drawing/2014/main" id="{3A6F43CA-10B9-4889-8E9F-B2F4105763A7}"/>
+                  <a16:creationId xmlns:a16="http://schemas.microsoft.com/office/drawing/2014/main" id="{1D6F083F-0377-47E4-85F1-E9FD2CBCD9AC}"/>
                 </a:ext>
               </a:extLst>
             </p:cNvPr>
@@ -6502,20 +7216,20 @@
             <p:nvPr/>
           </p:nvPicPr>
           <p:blipFill rotWithShape="1">
-            <a:blip r:embed="rId3">
+            <a:blip r:embed="rId4">
               <a:extLst>
                 <a:ext uri="{28A0092B-C50C-407E-A947-70E740481C1C}">
                   <a14:useLocalDpi xmlns:a14="http://schemas.microsoft.com/office/drawing/2010/main" val="0"/>
                 </a:ext>
               </a:extLst>
             </a:blip>
-            <a:srcRect l="26306" t="39075" r="72237" b="59444"/>
+            <a:srcRect l="59753" t="63455" r="32281" b="34624"/>
             <a:stretch/>
           </p:blipFill>
           <p:spPr>
             <a:xfrm>
-              <a:off x="3857487" y="2740634"/>
-              <a:ext cx="142299" cy="98314"/>
+              <a:off x="4940220" y="4270208"/>
+              <a:ext cx="729915" cy="120817"/>
             </a:xfrm>
             <a:prstGeom prst="rect">
               <a:avLst/>
@@ -6524,10 +7238,10 @@
         </p:pic>
         <p:pic>
           <p:nvPicPr>
-            <p:cNvPr id="7" name="图片 6">
+            <p:cNvPr id="14" name="图片 13">
               <a:extLst>
                 <a:ext uri="{FF2B5EF4-FFF2-40B4-BE49-F238E27FC236}">
-                  <a16:creationId xmlns:a16="http://schemas.microsoft.com/office/drawing/2014/main" id="{EA969411-3D55-48B8-BB13-0BF148051255}"/>
+                  <a16:creationId xmlns:a16="http://schemas.microsoft.com/office/drawing/2014/main" id="{656A9B33-7A40-44BC-80C6-F9D42DF8C831}"/>
                 </a:ext>
               </a:extLst>
             </p:cNvPr>
@@ -6537,90 +7251,20 @@
             <p:nvPr/>
           </p:nvPicPr>
           <p:blipFill rotWithShape="1">
-            <a:blip r:embed="rId3">
+            <a:blip r:embed="rId4">
               <a:extLst>
                 <a:ext uri="{28A0092B-C50C-407E-A947-70E740481C1C}">
                   <a14:useLocalDpi xmlns:a14="http://schemas.microsoft.com/office/drawing/2010/main" val="0"/>
                 </a:ext>
               </a:extLst>
             </a:blip>
-            <a:srcRect l="36804" t="38876" r="61654" b="59182"/>
+            <a:srcRect l="59753" t="63455" r="32281" b="34624"/>
             <a:stretch/>
           </p:blipFill>
           <p:spPr>
             <a:xfrm>
-              <a:off x="4804782" y="2729136"/>
-              <a:ext cx="142300" cy="121783"/>
-            </a:xfrm>
-            <a:prstGeom prst="rect">
-              <a:avLst/>
-            </a:prstGeom>
-          </p:spPr>
-        </p:pic>
-        <p:pic>
-          <p:nvPicPr>
-            <p:cNvPr id="8" name="图片 7">
-              <a:extLst>
-                <a:ext uri="{FF2B5EF4-FFF2-40B4-BE49-F238E27FC236}">
-                  <a16:creationId xmlns:a16="http://schemas.microsoft.com/office/drawing/2014/main" id="{A7BAAA58-DD56-463F-B1AF-4663D71D9B1F}"/>
-                </a:ext>
-              </a:extLst>
-            </p:cNvPr>
-            <p:cNvPicPr>
-              <a:picLocks noChangeAspect="1"/>
-            </p:cNvPicPr>
-            <p:nvPr/>
-          </p:nvPicPr>
-          <p:blipFill rotWithShape="1">
-            <a:blip r:embed="rId3">
-              <a:extLst>
-                <a:ext uri="{28A0092B-C50C-407E-A947-70E740481C1C}">
-                  <a14:useLocalDpi xmlns:a14="http://schemas.microsoft.com/office/drawing/2010/main" val="0"/>
-                </a:ext>
-              </a:extLst>
-            </a:blip>
-            <a:srcRect l="46740" t="38884" r="51734" b="58787"/>
-            <a:stretch/>
-          </p:blipFill>
-          <p:spPr>
-            <a:xfrm>
-              <a:off x="5708042" y="2722566"/>
-              <a:ext cx="154570" cy="160334"/>
-            </a:xfrm>
-            <a:prstGeom prst="rect">
-              <a:avLst/>
-            </a:prstGeom>
-          </p:spPr>
-        </p:pic>
-        <p:pic>
-          <p:nvPicPr>
-            <p:cNvPr id="9" name="图片 8">
-              <a:extLst>
-                <a:ext uri="{FF2B5EF4-FFF2-40B4-BE49-F238E27FC236}">
-                  <a16:creationId xmlns:a16="http://schemas.microsoft.com/office/drawing/2014/main" id="{540F3FEE-8CAE-4ADE-B854-85EA038B1A86}"/>
-                </a:ext>
-              </a:extLst>
-            </p:cNvPr>
-            <p:cNvPicPr>
-              <a:picLocks noChangeAspect="1"/>
-            </p:cNvPicPr>
-            <p:nvPr/>
-          </p:nvPicPr>
-          <p:blipFill rotWithShape="1">
-            <a:blip r:embed="rId3">
-              <a:extLst>
-                <a:ext uri="{28A0092B-C50C-407E-A947-70E740481C1C}">
-                  <a14:useLocalDpi xmlns:a14="http://schemas.microsoft.com/office/drawing/2010/main" val="0"/>
-                </a:ext>
-              </a:extLst>
-            </a:blip>
-            <a:srcRect l="56693" t="38913" r="41612" b="59216"/>
-            <a:stretch/>
-          </p:blipFill>
-          <p:spPr>
-            <a:xfrm>
-              <a:off x="6598957" y="2729136"/>
-              <a:ext cx="156386" cy="117289"/>
+              <a:off x="5843673" y="4270208"/>
+              <a:ext cx="729915" cy="120817"/>
             </a:xfrm>
             <a:prstGeom prst="rect">
               <a:avLst/>

</xml_diff>